<commit_message>
add new lesson for Asp .Net Core & DB
</commit_message>
<xml_diff>
--- a/Lessons/01.03 Entity framework.pptx
+++ b/Lessons/01.03 Entity framework.pptx
@@ -9,15 +9,16 @@
     <p:sldId id="257" r:id="rId6"/>
     <p:sldId id="258" r:id="rId7"/>
     <p:sldId id="264" r:id="rId8"/>
-    <p:sldId id="259" r:id="rId9"/>
-    <p:sldId id="260" r:id="rId10"/>
-    <p:sldId id="261" r:id="rId11"/>
-    <p:sldId id="262" r:id="rId12"/>
-    <p:sldId id="263" r:id="rId13"/>
-    <p:sldId id="265" r:id="rId14"/>
-    <p:sldId id="269" r:id="rId15"/>
-    <p:sldId id="267" r:id="rId16"/>
-    <p:sldId id="268" r:id="rId17"/>
+    <p:sldId id="270" r:id="rId9"/>
+    <p:sldId id="259" r:id="rId10"/>
+    <p:sldId id="260" r:id="rId11"/>
+    <p:sldId id="261" r:id="rId12"/>
+    <p:sldId id="262" r:id="rId13"/>
+    <p:sldId id="263" r:id="rId14"/>
+    <p:sldId id="265" r:id="rId15"/>
+    <p:sldId id="269" r:id="rId16"/>
+    <p:sldId id="267" r:id="rId17"/>
+    <p:sldId id="268" r:id="rId18"/>
   </p:sldIdLst>
   <p:sldSz cx="12192000" cy="6858000"/>
   <p:notesSz cx="6858000" cy="9144000"/>
@@ -116,6 +117,11 @@
       </a:defRPr>
     </a:lvl9pPr>
   </p:defaultTextStyle>
+  <p:extLst>
+    <p:ext uri="{EFAFB233-063F-42B5-8137-9DF3F51BA10A}">
+      <p15:sldGuideLst xmlns:p15="http://schemas.microsoft.com/office/powerpoint/2012/main"/>
+    </p:ext>
+  </p:extLst>
 </p:presentation>
 </file>
 
@@ -3735,7 +3741,7 @@
           <a:p>
             <a:fld id="{12241623-A064-4BED-B073-BA4D61433402}" type="datetime1">
               <a:rPr lang="en-US" smtClean="0"/>
-              <a:t>9/29/2020</a:t>
+              <a:t>10/6/2020</a:t>
             </a:fld>
             <a:endParaRPr lang="en-US" dirty="0"/>
           </a:p>
@@ -4546,7 +4552,7 @@
           <a:p>
             <a:fld id="{6F86ED0C-1DA7-41F0-94CF-6218B1FEDFF1}" type="datetime1">
               <a:rPr lang="en-US" smtClean="0"/>
-              <a:t>9/29/2020</a:t>
+              <a:t>10/6/2020</a:t>
             </a:fld>
             <a:endParaRPr lang="en-US" dirty="0"/>
           </a:p>
@@ -4745,7 +4751,7 @@
           <a:p>
             <a:fld id="{EECF02AB-6034-4B88-BC5A-7C17CB0EF809}" type="datetime1">
               <a:rPr lang="en-US" smtClean="0"/>
-              <a:t>9/29/2020</a:t>
+              <a:t>10/6/2020</a:t>
             </a:fld>
             <a:endParaRPr lang="en-US" dirty="0"/>
           </a:p>
@@ -4980,7 +4986,7 @@
           <a:p>
             <a:fld id="{22F3E5F3-28EE-488F-BD53-B744C06C3DEC}" type="datetime1">
               <a:rPr lang="en-US" smtClean="0"/>
-              <a:t>9/29/2020</a:t>
+              <a:t>10/6/2020</a:t>
             </a:fld>
             <a:endParaRPr lang="en-US" dirty="0"/>
           </a:p>
@@ -7673,7 +7679,7 @@
           <a:p>
             <a:fld id="{E72EB70D-CD01-44DA-83B3-8FEB3383D307}" type="datetime1">
               <a:rPr lang="en-US" smtClean="0"/>
-              <a:t>9/29/2020</a:t>
+              <a:t>10/6/2020</a:t>
             </a:fld>
             <a:endParaRPr lang="en-US" dirty="0"/>
           </a:p>
@@ -7869,7 +7875,7 @@
           <a:p>
             <a:fld id="{D0158CFD-9357-46BE-A189-D637A67C8730}" type="datetime1">
               <a:rPr lang="en-US" smtClean="0"/>
-              <a:t>9/29/2020</a:t>
+              <a:t>10/6/2020</a:t>
             </a:fld>
             <a:endParaRPr lang="en-US" dirty="0"/>
           </a:p>
@@ -8258,7 +8264,7 @@
           <a:p>
             <a:fld id="{7B4742EE-B331-4632-BD10-A82FED6B6FC0}" type="datetime1">
               <a:rPr lang="en-US" smtClean="0"/>
-              <a:t>9/29/2020</a:t>
+              <a:t>10/6/2020</a:t>
             </a:fld>
             <a:endParaRPr lang="en-US" dirty="0"/>
           </a:p>
@@ -8424,7 +8430,7 @@
           <a:p>
             <a:fld id="{451BA835-D13F-49F4-8F11-5D576AC65FAD}" type="datetime1">
               <a:rPr lang="en-US" smtClean="0"/>
-              <a:t>9/29/2020</a:t>
+              <a:t>10/6/2020</a:t>
             </a:fld>
             <a:endParaRPr lang="en-US" dirty="0"/>
           </a:p>
@@ -8547,7 +8553,7 @@
           <a:p>
             <a:fld id="{ADBD1799-ACB5-4CB2-86A2-5C574F1C8706}" type="datetime1">
               <a:rPr lang="en-US" smtClean="0"/>
-              <a:t>9/29/2020</a:t>
+              <a:t>10/6/2020</a:t>
             </a:fld>
             <a:endParaRPr lang="en-US" dirty="0"/>
           </a:p>
@@ -8857,7 +8863,7 @@
           <a:p>
             <a:fld id="{ED5DD0D6-7A82-473E-879B-C6ECD6CCCFEC}" type="datetime1">
               <a:rPr lang="en-US" smtClean="0"/>
-              <a:t>9/29/2020</a:t>
+              <a:t>10/6/2020</a:t>
             </a:fld>
             <a:endParaRPr lang="en-US" dirty="0"/>
           </a:p>
@@ -9157,7 +9163,7 @@
           <a:p>
             <a:fld id="{D4605E03-BC17-41A7-854C-DFAB672737DC}" type="datetime1">
               <a:rPr lang="en-US" smtClean="0"/>
-              <a:t>9/29/2020</a:t>
+              <a:t>10/6/2020</a:t>
             </a:fld>
             <a:endParaRPr lang="en-US" dirty="0"/>
           </a:p>
@@ -9409,7 +9415,7 @@
           <a:p>
             <a:fld id="{C4408324-A84C-4A45-93B6-78D079CCE772}" type="datetime1">
               <a:rPr lang="en-US" smtClean="0"/>
-              <a:t>9/29/2020</a:t>
+              <a:t>10/6/2020</a:t>
             </a:fld>
             <a:endParaRPr lang="en-US" dirty="0"/>
           </a:p>
@@ -11236,6 +11242,941 @@
           <p:cNvPr id="9" name="Rectangle 8">
             <a:extLst>
               <a:ext uri="{FF2B5EF4-FFF2-40B4-BE49-F238E27FC236}">
+                <a16:creationId xmlns:a16="http://schemas.microsoft.com/office/drawing/2014/main" id="{8181FC64-B306-4821-98E2-780662EFC486}"/>
+              </a:ext>
+              <a:ext uri="{C183D7F6-B498-43B3-948B-1728B52AA6E4}">
+                <adec:decorative xmlns:adec="http://schemas.microsoft.com/office/drawing/2017/decorative" val="1"/>
+              </a:ext>
+            </a:extLst>
+          </p:cNvPr>
+          <p:cNvSpPr>
+            <a:spLocks noGrp="1" noRot="1" noChangeAspect="1" noMove="1" noResize="1" noEditPoints="1" noAdjustHandles="1" noChangeArrowheads="1" noChangeShapeType="1" noTextEdit="1"/>
+          </p:cNvSpPr>
+          <p:nvPr>
+            <p:extLst>
+              <p:ext uri="{386F3935-93C4-4BCD-93E2-E3B085C9AB24}">
+                <p16:designElem xmlns:p16="http://schemas.microsoft.com/office/powerpoint/2015/main" val="1"/>
+              </p:ext>
+            </p:extLst>
+          </p:nvPr>
+        </p:nvSpPr>
+        <p:spPr>
+          <a:xfrm>
+            <a:off x="305" y="0"/>
+            <a:ext cx="12191695" cy="6858000"/>
+          </a:xfrm>
+          <a:prstGeom prst="rect">
+            <a:avLst/>
+          </a:prstGeom>
+          <a:ln>
+            <a:noFill/>
+          </a:ln>
+        </p:spPr>
+        <p:style>
+          <a:lnRef idx="2">
+            <a:schemeClr val="accent1">
+              <a:shade val="50000"/>
+            </a:schemeClr>
+          </a:lnRef>
+          <a:fillRef idx="1">
+            <a:schemeClr val="accent1"/>
+          </a:fillRef>
+          <a:effectRef idx="0">
+            <a:schemeClr val="accent1"/>
+          </a:effectRef>
+          <a:fontRef idx="minor">
+            <a:schemeClr val="lt1"/>
+          </a:fontRef>
+        </p:style>
+        <p:txBody>
+          <a:bodyPr rtlCol="0" anchor="ctr"/>
+          <a:lstStyle/>
+          <a:p>
+            <a:pPr marL="0" marR="0" lvl="0" indent="0" algn="ctr" defTabSz="457200" rtl="0" eaLnBrk="1" fontAlgn="auto" latinLnBrk="0" hangingPunct="1">
+              <a:lnSpc>
+                <a:spcPct val="100000"/>
+              </a:lnSpc>
+              <a:spcBef>
+                <a:spcPts val="0"/>
+              </a:spcBef>
+              <a:spcAft>
+                <a:spcPts val="0"/>
+              </a:spcAft>
+              <a:buClrTx/>
+              <a:buSzTx/>
+              <a:buFontTx/>
+              <a:buNone/>
+              <a:tabLst/>
+              <a:defRPr/>
+            </a:pPr>
+            <a:endParaRPr kumimoji="0" lang="en-US" sz="1800" b="0" i="0" u="none" strike="noStrike" kern="1200" cap="none" spc="0" normalizeH="0" baseline="0" noProof="0" dirty="0">
+              <a:ln>
+                <a:noFill/>
+              </a:ln>
+              <a:solidFill>
+                <a:prstClr val="white"/>
+              </a:solidFill>
+              <a:effectLst/>
+              <a:uLnTx/>
+              <a:uFillTx/>
+              <a:latin typeface="Meiryo"/>
+              <a:ea typeface="+mn-ea"/>
+              <a:cs typeface="+mn-cs"/>
+            </a:endParaRPr>
+          </a:p>
+        </p:txBody>
+      </p:sp>
+      <p:sp>
+        <p:nvSpPr>
+          <p:cNvPr id="11" name="Freeform: Shape 10">
+            <a:extLst>
+              <a:ext uri="{FF2B5EF4-FFF2-40B4-BE49-F238E27FC236}">
+                <a16:creationId xmlns:a16="http://schemas.microsoft.com/office/drawing/2014/main" id="{BC0385E9-02B2-4941-889A-EAD43F5BB0A3}"/>
+              </a:ext>
+              <a:ext uri="{C183D7F6-B498-43B3-948B-1728B52AA6E4}">
+                <adec:decorative xmlns:adec="http://schemas.microsoft.com/office/drawing/2017/decorative" val="1"/>
+              </a:ext>
+            </a:extLst>
+          </p:cNvPr>
+          <p:cNvSpPr>
+            <a:spLocks noGrp="1" noRot="1" noChangeAspect="1" noMove="1" noResize="1" noEditPoints="1" noAdjustHandles="1" noChangeArrowheads="1" noChangeShapeType="1" noTextEdit="1"/>
+          </p:cNvSpPr>
+          <p:nvPr>
+            <p:extLst>
+              <p:ext uri="{386F3935-93C4-4BCD-93E2-E3B085C9AB24}">
+                <p16:designElem xmlns:p16="http://schemas.microsoft.com/office/powerpoint/2015/main" val="1"/>
+              </p:ext>
+            </p:extLst>
+          </p:nvPr>
+        </p:nvSpPr>
+        <p:spPr>
+          <a:xfrm flipH="1">
+            <a:off x="6736139" y="0"/>
+            <a:ext cx="5455860" cy="6858000"/>
+          </a:xfrm>
+          <a:custGeom>
+            <a:avLst/>
+            <a:gdLst>
+              <a:gd name="connsiteX0" fmla="*/ 3832837 w 5455860"/>
+              <a:gd name="connsiteY0" fmla="*/ 0 h 6858000"/>
+              <a:gd name="connsiteX1" fmla="*/ 2739604 w 5455860"/>
+              <a:gd name="connsiteY1" fmla="*/ 0 h 6858000"/>
+              <a:gd name="connsiteX2" fmla="*/ 1959438 w 5455860"/>
+              <a:gd name="connsiteY2" fmla="*/ 0 h 6858000"/>
+              <a:gd name="connsiteX3" fmla="*/ 1895061 w 5455860"/>
+              <a:gd name="connsiteY3" fmla="*/ 0 h 6858000"/>
+              <a:gd name="connsiteX4" fmla="*/ 249909 w 5455860"/>
+              <a:gd name="connsiteY4" fmla="*/ 0 h 6858000"/>
+              <a:gd name="connsiteX5" fmla="*/ 0 w 5455860"/>
+              <a:gd name="connsiteY5" fmla="*/ 0 h 6858000"/>
+              <a:gd name="connsiteX6" fmla="*/ 0 w 5455860"/>
+              <a:gd name="connsiteY6" fmla="*/ 6858000 h 6858000"/>
+              <a:gd name="connsiteX7" fmla="*/ 249909 w 5455860"/>
+              <a:gd name="connsiteY7" fmla="*/ 6858000 h 6858000"/>
+              <a:gd name="connsiteX8" fmla="*/ 1895061 w 5455860"/>
+              <a:gd name="connsiteY8" fmla="*/ 6858000 h 6858000"/>
+              <a:gd name="connsiteX9" fmla="*/ 1959438 w 5455860"/>
+              <a:gd name="connsiteY9" fmla="*/ 6858000 h 6858000"/>
+              <a:gd name="connsiteX10" fmla="*/ 2739604 w 5455860"/>
+              <a:gd name="connsiteY10" fmla="*/ 6858000 h 6858000"/>
+              <a:gd name="connsiteX11" fmla="*/ 2953106 w 5455860"/>
+              <a:gd name="connsiteY11" fmla="*/ 6858000 h 6858000"/>
+              <a:gd name="connsiteX12" fmla="*/ 3064862 w 5455860"/>
+              <a:gd name="connsiteY12" fmla="*/ 6780599 h 6858000"/>
+              <a:gd name="connsiteX13" fmla="*/ 3581510 w 5455860"/>
+              <a:gd name="connsiteY13" fmla="*/ 6374814 h 6858000"/>
+              <a:gd name="connsiteX14" fmla="*/ 5455860 w 5455860"/>
+              <a:gd name="connsiteY14" fmla="*/ 3621656 h 6858000"/>
+              <a:gd name="connsiteX15" fmla="*/ 3854961 w 5455860"/>
+              <a:gd name="connsiteY15" fmla="*/ 14997 h 6858000"/>
+            </a:gdLst>
+            <a:ahLst/>
+            <a:cxnLst>
+              <a:cxn ang="0">
+                <a:pos x="connsiteX0" y="connsiteY0"/>
+              </a:cxn>
+              <a:cxn ang="0">
+                <a:pos x="connsiteX1" y="connsiteY1"/>
+              </a:cxn>
+              <a:cxn ang="0">
+                <a:pos x="connsiteX2" y="connsiteY2"/>
+              </a:cxn>
+              <a:cxn ang="0">
+                <a:pos x="connsiteX3" y="connsiteY3"/>
+              </a:cxn>
+              <a:cxn ang="0">
+                <a:pos x="connsiteX4" y="connsiteY4"/>
+              </a:cxn>
+              <a:cxn ang="0">
+                <a:pos x="connsiteX5" y="connsiteY5"/>
+              </a:cxn>
+              <a:cxn ang="0">
+                <a:pos x="connsiteX6" y="connsiteY6"/>
+              </a:cxn>
+              <a:cxn ang="0">
+                <a:pos x="connsiteX7" y="connsiteY7"/>
+              </a:cxn>
+              <a:cxn ang="0">
+                <a:pos x="connsiteX8" y="connsiteY8"/>
+              </a:cxn>
+              <a:cxn ang="0">
+                <a:pos x="connsiteX9" y="connsiteY9"/>
+              </a:cxn>
+              <a:cxn ang="0">
+                <a:pos x="connsiteX10" y="connsiteY10"/>
+              </a:cxn>
+              <a:cxn ang="0">
+                <a:pos x="connsiteX11" y="connsiteY11"/>
+              </a:cxn>
+              <a:cxn ang="0">
+                <a:pos x="connsiteX12" y="connsiteY12"/>
+              </a:cxn>
+              <a:cxn ang="0">
+                <a:pos x="connsiteX13" y="connsiteY13"/>
+              </a:cxn>
+              <a:cxn ang="0">
+                <a:pos x="connsiteX14" y="connsiteY14"/>
+              </a:cxn>
+              <a:cxn ang="0">
+                <a:pos x="connsiteX15" y="connsiteY15"/>
+              </a:cxn>
+            </a:cxnLst>
+            <a:rect l="l" t="t" r="r" b="b"/>
+            <a:pathLst>
+              <a:path w="5455860" h="6858000">
+                <a:moveTo>
+                  <a:pt x="3832837" y="0"/>
+                </a:moveTo>
+                <a:lnTo>
+                  <a:pt x="2739604" y="0"/>
+                </a:lnTo>
+                <a:lnTo>
+                  <a:pt x="1959438" y="0"/>
+                </a:lnTo>
+                <a:lnTo>
+                  <a:pt x="1895061" y="0"/>
+                </a:lnTo>
+                <a:lnTo>
+                  <a:pt x="249909" y="0"/>
+                </a:lnTo>
+                <a:lnTo>
+                  <a:pt x="0" y="0"/>
+                </a:lnTo>
+                <a:lnTo>
+                  <a:pt x="0" y="6858000"/>
+                </a:lnTo>
+                <a:lnTo>
+                  <a:pt x="249909" y="6858000"/>
+                </a:lnTo>
+                <a:lnTo>
+                  <a:pt x="1895061" y="6858000"/>
+                </a:lnTo>
+                <a:lnTo>
+                  <a:pt x="1959438" y="6858000"/>
+                </a:lnTo>
+                <a:lnTo>
+                  <a:pt x="2739604" y="6858000"/>
+                </a:lnTo>
+                <a:lnTo>
+                  <a:pt x="2953106" y="6858000"/>
+                </a:lnTo>
+                <a:lnTo>
+                  <a:pt x="3064862" y="6780599"/>
+                </a:lnTo>
+                <a:cubicBezTo>
+                  <a:pt x="3238680" y="6653108"/>
+                  <a:pt x="3409307" y="6515397"/>
+                  <a:pt x="3581510" y="6374814"/>
+                </a:cubicBezTo>
+                <a:cubicBezTo>
+                  <a:pt x="4527135" y="5602839"/>
+                  <a:pt x="5455860" y="4969131"/>
+                  <a:pt x="5455860" y="3621656"/>
+                </a:cubicBezTo>
+                <a:cubicBezTo>
+                  <a:pt x="5455860" y="2093192"/>
+                  <a:pt x="4882124" y="754641"/>
+                  <a:pt x="3854961" y="14997"/>
+                </a:cubicBezTo>
+                <a:close/>
+              </a:path>
+            </a:pathLst>
+          </a:custGeom>
+          <a:solidFill>
+            <a:schemeClr val="bg1">
+              <a:alpha val="60000"/>
+            </a:schemeClr>
+          </a:solidFill>
+          <a:ln>
+            <a:noFill/>
+          </a:ln>
+        </p:spPr>
+        <p:style>
+          <a:lnRef idx="2">
+            <a:schemeClr val="accent1">
+              <a:shade val="50000"/>
+            </a:schemeClr>
+          </a:lnRef>
+          <a:fillRef idx="1">
+            <a:schemeClr val="accent1"/>
+          </a:fillRef>
+          <a:effectRef idx="0">
+            <a:schemeClr val="accent1"/>
+          </a:effectRef>
+          <a:fontRef idx="minor">
+            <a:schemeClr val="lt1"/>
+          </a:fontRef>
+        </p:style>
+        <p:txBody>
+          <a:bodyPr wrap="square" rtlCol="0" anchor="ctr">
+            <a:noAutofit/>
+          </a:bodyPr>
+          <a:lstStyle/>
+          <a:p>
+            <a:pPr algn="ctr"/>
+            <a:endParaRPr lang="en-US" dirty="0"/>
+          </a:p>
+        </p:txBody>
+      </p:sp>
+      <p:sp>
+        <p:nvSpPr>
+          <p:cNvPr id="13" name="Freeform: Shape 12">
+            <a:extLst>
+              <a:ext uri="{FF2B5EF4-FFF2-40B4-BE49-F238E27FC236}">
+                <a16:creationId xmlns:a16="http://schemas.microsoft.com/office/drawing/2014/main" id="{829A1E2C-5AC8-40FC-99E9-832069D39792}"/>
+              </a:ext>
+              <a:ext uri="{C183D7F6-B498-43B3-948B-1728B52AA6E4}">
+                <adec:decorative xmlns:adec="http://schemas.microsoft.com/office/drawing/2017/decorative" val="1"/>
+              </a:ext>
+            </a:extLst>
+          </p:cNvPr>
+          <p:cNvSpPr>
+            <a:spLocks noGrp="1" noRot="1" noChangeAspect="1" noMove="1" noResize="1" noEditPoints="1" noAdjustHandles="1" noChangeArrowheads="1" noChangeShapeType="1" noTextEdit="1"/>
+          </p:cNvSpPr>
+          <p:nvPr>
+            <p:extLst>
+              <p:ext uri="{386F3935-93C4-4BCD-93E2-E3B085C9AB24}">
+                <p16:designElem xmlns:p16="http://schemas.microsoft.com/office/powerpoint/2015/main" val="1"/>
+              </p:ext>
+            </p:extLst>
+          </p:nvPr>
+        </p:nvSpPr>
+        <p:spPr>
+          <a:xfrm flipH="1">
+            <a:off x="6255864" y="0"/>
+            <a:ext cx="2529723" cy="6858000"/>
+          </a:xfrm>
+          <a:custGeom>
+            <a:avLst/>
+            <a:gdLst>
+              <a:gd name="connsiteX0" fmla="*/ 1258269 w 2529723"/>
+              <a:gd name="connsiteY0" fmla="*/ 0 h 6858000"/>
+              <a:gd name="connsiteX1" fmla="*/ 1275627 w 2529723"/>
+              <a:gd name="connsiteY1" fmla="*/ 0 h 6858000"/>
+              <a:gd name="connsiteX2" fmla="*/ 1302560 w 2529723"/>
+              <a:gd name="connsiteY2" fmla="*/ 24338 h 6858000"/>
+              <a:gd name="connsiteX3" fmla="*/ 2522825 w 2529723"/>
+              <a:gd name="connsiteY3" fmla="*/ 3678515 h 6858000"/>
+              <a:gd name="connsiteX4" fmla="*/ 557500 w 2529723"/>
+              <a:gd name="connsiteY4" fmla="*/ 6451411 h 6858000"/>
+              <a:gd name="connsiteX5" fmla="*/ 32482 w 2529723"/>
+              <a:gd name="connsiteY5" fmla="*/ 6849373 h 6858000"/>
+              <a:gd name="connsiteX6" fmla="*/ 19531 w 2529723"/>
+              <a:gd name="connsiteY6" fmla="*/ 6858000 h 6858000"/>
+              <a:gd name="connsiteX7" fmla="*/ 0 w 2529723"/>
+              <a:gd name="connsiteY7" fmla="*/ 6858000 h 6858000"/>
+              <a:gd name="connsiteX8" fmla="*/ 14202 w 2529723"/>
+              <a:gd name="connsiteY8" fmla="*/ 6848540 h 6858000"/>
+              <a:gd name="connsiteX9" fmla="*/ 539221 w 2529723"/>
+              <a:gd name="connsiteY9" fmla="*/ 6450578 h 6858000"/>
+              <a:gd name="connsiteX10" fmla="*/ 2504546 w 2529723"/>
+              <a:gd name="connsiteY10" fmla="*/ 3677682 h 6858000"/>
+              <a:gd name="connsiteX11" fmla="*/ 1284280 w 2529723"/>
+              <a:gd name="connsiteY11" fmla="*/ 23504 h 6858000"/>
+            </a:gdLst>
+            <a:ahLst/>
+            <a:cxnLst>
+              <a:cxn ang="0">
+                <a:pos x="connsiteX0" y="connsiteY0"/>
+              </a:cxn>
+              <a:cxn ang="0">
+                <a:pos x="connsiteX1" y="connsiteY1"/>
+              </a:cxn>
+              <a:cxn ang="0">
+                <a:pos x="connsiteX2" y="connsiteY2"/>
+              </a:cxn>
+              <a:cxn ang="0">
+                <a:pos x="connsiteX3" y="connsiteY3"/>
+              </a:cxn>
+              <a:cxn ang="0">
+                <a:pos x="connsiteX4" y="connsiteY4"/>
+              </a:cxn>
+              <a:cxn ang="0">
+                <a:pos x="connsiteX5" y="connsiteY5"/>
+              </a:cxn>
+              <a:cxn ang="0">
+                <a:pos x="connsiteX6" y="connsiteY6"/>
+              </a:cxn>
+              <a:cxn ang="0">
+                <a:pos x="connsiteX7" y="connsiteY7"/>
+              </a:cxn>
+              <a:cxn ang="0">
+                <a:pos x="connsiteX8" y="connsiteY8"/>
+              </a:cxn>
+              <a:cxn ang="0">
+                <a:pos x="connsiteX9" y="connsiteY9"/>
+              </a:cxn>
+              <a:cxn ang="0">
+                <a:pos x="connsiteX10" y="connsiteY10"/>
+              </a:cxn>
+              <a:cxn ang="0">
+                <a:pos x="connsiteX11" y="connsiteY11"/>
+              </a:cxn>
+            </a:cxnLst>
+            <a:rect l="l" t="t" r="r" b="b"/>
+            <a:pathLst>
+              <a:path w="2529723" h="6858000">
+                <a:moveTo>
+                  <a:pt x="1258269" y="0"/>
+                </a:moveTo>
+                <a:lnTo>
+                  <a:pt x="1275627" y="0"/>
+                </a:lnTo>
+                <a:lnTo>
+                  <a:pt x="1302560" y="24338"/>
+                </a:lnTo>
+                <a:cubicBezTo>
+                  <a:pt x="2156831" y="855667"/>
+                  <a:pt x="2590622" y="2191755"/>
+                  <a:pt x="2522825" y="3678515"/>
+                </a:cubicBezTo>
+                <a:cubicBezTo>
+                  <a:pt x="2459072" y="5076606"/>
+                  <a:pt x="1519830" y="5692656"/>
+                  <a:pt x="557500" y="6451411"/>
+                </a:cubicBezTo>
+                <a:cubicBezTo>
+                  <a:pt x="382255" y="6589587"/>
+                  <a:pt x="208689" y="6724853"/>
+                  <a:pt x="32482" y="6849373"/>
+                </a:cubicBezTo>
+                <a:lnTo>
+                  <a:pt x="19531" y="6858000"/>
+                </a:lnTo>
+                <a:lnTo>
+                  <a:pt x="0" y="6858000"/>
+                </a:lnTo>
+                <a:lnTo>
+                  <a:pt x="14202" y="6848540"/>
+                </a:lnTo>
+                <a:cubicBezTo>
+                  <a:pt x="190409" y="6724020"/>
+                  <a:pt x="363976" y="6588754"/>
+                  <a:pt x="539221" y="6450578"/>
+                </a:cubicBezTo>
+                <a:cubicBezTo>
+                  <a:pt x="1501550" y="5691822"/>
+                  <a:pt x="2440792" y="5075773"/>
+                  <a:pt x="2504546" y="3677682"/>
+                </a:cubicBezTo>
+                <a:cubicBezTo>
+                  <a:pt x="2572343" y="2190921"/>
+                  <a:pt x="2138551" y="854834"/>
+                  <a:pt x="1284280" y="23504"/>
+                </a:cubicBezTo>
+                <a:close/>
+              </a:path>
+            </a:pathLst>
+          </a:custGeom>
+          <a:solidFill>
+            <a:srgbClr val="FFFFFF"/>
+          </a:solidFill>
+          <a:ln>
+            <a:noFill/>
+          </a:ln>
+        </p:spPr>
+        <p:style>
+          <a:lnRef idx="2">
+            <a:schemeClr val="accent1">
+              <a:shade val="50000"/>
+            </a:schemeClr>
+          </a:lnRef>
+          <a:fillRef idx="1">
+            <a:schemeClr val="accent1"/>
+          </a:fillRef>
+          <a:effectRef idx="0">
+            <a:schemeClr val="accent1"/>
+          </a:effectRef>
+          <a:fontRef idx="minor">
+            <a:schemeClr val="lt1"/>
+          </a:fontRef>
+        </p:style>
+        <p:txBody>
+          <a:bodyPr wrap="square" rtlCol="0" anchor="ctr">
+            <a:noAutofit/>
+          </a:bodyPr>
+          <a:lstStyle/>
+          <a:p>
+            <a:pPr marL="0" marR="0" lvl="0" indent="0" algn="ctr" defTabSz="457200" rtl="0" eaLnBrk="1" fontAlgn="auto" latinLnBrk="0" hangingPunct="1">
+              <a:lnSpc>
+                <a:spcPct val="100000"/>
+              </a:lnSpc>
+              <a:spcBef>
+                <a:spcPts val="0"/>
+              </a:spcBef>
+              <a:spcAft>
+                <a:spcPts val="0"/>
+              </a:spcAft>
+              <a:buClrTx/>
+              <a:buSzTx/>
+              <a:buFontTx/>
+              <a:buNone/>
+              <a:tabLst/>
+              <a:defRPr/>
+            </a:pPr>
+            <a:endParaRPr kumimoji="0" lang="en-US" sz="1800" b="0" i="0" u="none" strike="noStrike" kern="1200" cap="none" spc="0" normalizeH="0" baseline="0" noProof="0" dirty="0">
+              <a:ln>
+                <a:noFill/>
+              </a:ln>
+              <a:solidFill>
+                <a:prstClr val="white"/>
+              </a:solidFill>
+              <a:effectLst/>
+              <a:uLnTx/>
+              <a:uFillTx/>
+              <a:latin typeface="Meiryo"/>
+              <a:ea typeface="+mn-ea"/>
+              <a:cs typeface="+mn-cs"/>
+            </a:endParaRPr>
+          </a:p>
+        </p:txBody>
+      </p:sp>
+      <p:sp>
+        <p:nvSpPr>
+          <p:cNvPr id="15" name="Freeform: Shape 14">
+            <a:extLst>
+              <a:ext uri="{FF2B5EF4-FFF2-40B4-BE49-F238E27FC236}">
+                <a16:creationId xmlns:a16="http://schemas.microsoft.com/office/drawing/2014/main" id="{55C54A75-E44A-4147-B9D0-FF46CFD31612}"/>
+              </a:ext>
+              <a:ext uri="{C183D7F6-B498-43B3-948B-1728B52AA6E4}">
+                <adec:decorative xmlns:adec="http://schemas.microsoft.com/office/drawing/2017/decorative" val="1"/>
+              </a:ext>
+            </a:extLst>
+          </p:cNvPr>
+          <p:cNvSpPr>
+            <a:spLocks noGrp="1" noRot="1" noChangeAspect="1" noMove="1" noResize="1" noEditPoints="1" noAdjustHandles="1" noChangeArrowheads="1" noChangeShapeType="1" noTextEdit="1"/>
+          </p:cNvSpPr>
+          <p:nvPr>
+            <p:extLst>
+              <p:ext uri="{386F3935-93C4-4BCD-93E2-E3B085C9AB24}">
+                <p16:designElem xmlns:p16="http://schemas.microsoft.com/office/powerpoint/2015/main" val="1"/>
+              </p:ext>
+            </p:extLst>
+          </p:nvPr>
+        </p:nvSpPr>
+        <p:spPr>
+          <a:xfrm flipH="1">
+            <a:off x="6469160" y="0"/>
+            <a:ext cx="2536434" cy="6858000"/>
+          </a:xfrm>
+          <a:custGeom>
+            <a:avLst/>
+            <a:gdLst>
+              <a:gd name="connsiteX0" fmla="*/ 879731 w 2536434"/>
+              <a:gd name="connsiteY0" fmla="*/ 0 h 6858000"/>
+              <a:gd name="connsiteX1" fmla="*/ 913411 w 2536434"/>
+              <a:gd name="connsiteY1" fmla="*/ 0 h 6858000"/>
+              <a:gd name="connsiteX2" fmla="*/ 935535 w 2536434"/>
+              <a:gd name="connsiteY2" fmla="*/ 14997 h 6858000"/>
+              <a:gd name="connsiteX3" fmla="*/ 2536434 w 2536434"/>
+              <a:gd name="connsiteY3" fmla="*/ 3621656 h 6858000"/>
+              <a:gd name="connsiteX4" fmla="*/ 662084 w 2536434"/>
+              <a:gd name="connsiteY4" fmla="*/ 6374814 h 6858000"/>
+              <a:gd name="connsiteX5" fmla="*/ 145436 w 2536434"/>
+              <a:gd name="connsiteY5" fmla="*/ 6780599 h 6858000"/>
+              <a:gd name="connsiteX6" fmla="*/ 33680 w 2536434"/>
+              <a:gd name="connsiteY6" fmla="*/ 6858000 h 6858000"/>
+              <a:gd name="connsiteX7" fmla="*/ 0 w 2536434"/>
+              <a:gd name="connsiteY7" fmla="*/ 6858000 h 6858000"/>
+              <a:gd name="connsiteX8" fmla="*/ 111756 w 2536434"/>
+              <a:gd name="connsiteY8" fmla="*/ 6780599 h 6858000"/>
+              <a:gd name="connsiteX9" fmla="*/ 628404 w 2536434"/>
+              <a:gd name="connsiteY9" fmla="*/ 6374814 h 6858000"/>
+              <a:gd name="connsiteX10" fmla="*/ 2502754 w 2536434"/>
+              <a:gd name="connsiteY10" fmla="*/ 3621656 h 6858000"/>
+              <a:gd name="connsiteX11" fmla="*/ 901855 w 2536434"/>
+              <a:gd name="connsiteY11" fmla="*/ 14997 h 6858000"/>
+            </a:gdLst>
+            <a:ahLst/>
+            <a:cxnLst>
+              <a:cxn ang="0">
+                <a:pos x="connsiteX0" y="connsiteY0"/>
+              </a:cxn>
+              <a:cxn ang="0">
+                <a:pos x="connsiteX1" y="connsiteY1"/>
+              </a:cxn>
+              <a:cxn ang="0">
+                <a:pos x="connsiteX2" y="connsiteY2"/>
+              </a:cxn>
+              <a:cxn ang="0">
+                <a:pos x="connsiteX3" y="connsiteY3"/>
+              </a:cxn>
+              <a:cxn ang="0">
+                <a:pos x="connsiteX4" y="connsiteY4"/>
+              </a:cxn>
+              <a:cxn ang="0">
+                <a:pos x="connsiteX5" y="connsiteY5"/>
+              </a:cxn>
+              <a:cxn ang="0">
+                <a:pos x="connsiteX6" y="connsiteY6"/>
+              </a:cxn>
+              <a:cxn ang="0">
+                <a:pos x="connsiteX7" y="connsiteY7"/>
+              </a:cxn>
+              <a:cxn ang="0">
+                <a:pos x="connsiteX8" y="connsiteY8"/>
+              </a:cxn>
+              <a:cxn ang="0">
+                <a:pos x="connsiteX9" y="connsiteY9"/>
+              </a:cxn>
+              <a:cxn ang="0">
+                <a:pos x="connsiteX10" y="connsiteY10"/>
+              </a:cxn>
+              <a:cxn ang="0">
+                <a:pos x="connsiteX11" y="connsiteY11"/>
+              </a:cxn>
+            </a:cxnLst>
+            <a:rect l="l" t="t" r="r" b="b"/>
+            <a:pathLst>
+              <a:path w="2536434" h="6858000">
+                <a:moveTo>
+                  <a:pt x="879731" y="0"/>
+                </a:moveTo>
+                <a:lnTo>
+                  <a:pt x="913411" y="0"/>
+                </a:lnTo>
+                <a:lnTo>
+                  <a:pt x="935535" y="14997"/>
+                </a:lnTo>
+                <a:cubicBezTo>
+                  <a:pt x="1962698" y="754641"/>
+                  <a:pt x="2536434" y="2093192"/>
+                  <a:pt x="2536434" y="3621656"/>
+                </a:cubicBezTo>
+                <a:cubicBezTo>
+                  <a:pt x="2536434" y="4969131"/>
+                  <a:pt x="1607709" y="5602839"/>
+                  <a:pt x="662084" y="6374814"/>
+                </a:cubicBezTo>
+                <a:cubicBezTo>
+                  <a:pt x="489881" y="6515397"/>
+                  <a:pt x="319254" y="6653108"/>
+                  <a:pt x="145436" y="6780599"/>
+                </a:cubicBezTo>
+                <a:lnTo>
+                  <a:pt x="33680" y="6858000"/>
+                </a:lnTo>
+                <a:lnTo>
+                  <a:pt x="0" y="6858000"/>
+                </a:lnTo>
+                <a:lnTo>
+                  <a:pt x="111756" y="6780599"/>
+                </a:lnTo>
+                <a:cubicBezTo>
+                  <a:pt x="285574" y="6653108"/>
+                  <a:pt x="456201" y="6515397"/>
+                  <a:pt x="628404" y="6374814"/>
+                </a:cubicBezTo>
+                <a:cubicBezTo>
+                  <a:pt x="1574029" y="5602839"/>
+                  <a:pt x="2502754" y="4969131"/>
+                  <a:pt x="2502754" y="3621656"/>
+                </a:cubicBezTo>
+                <a:cubicBezTo>
+                  <a:pt x="2502754" y="2093192"/>
+                  <a:pt x="1929018" y="754641"/>
+                  <a:pt x="901855" y="14997"/>
+                </a:cubicBezTo>
+                <a:close/>
+              </a:path>
+            </a:pathLst>
+          </a:custGeom>
+          <a:solidFill>
+            <a:srgbClr val="FFFFFF"/>
+          </a:solidFill>
+          <a:ln>
+            <a:noFill/>
+          </a:ln>
+        </p:spPr>
+        <p:style>
+          <a:lnRef idx="2">
+            <a:schemeClr val="accent1">
+              <a:shade val="50000"/>
+            </a:schemeClr>
+          </a:lnRef>
+          <a:fillRef idx="1">
+            <a:schemeClr val="accent1"/>
+          </a:fillRef>
+          <a:effectRef idx="0">
+            <a:schemeClr val="accent1"/>
+          </a:effectRef>
+          <a:fontRef idx="minor">
+            <a:schemeClr val="lt1"/>
+          </a:fontRef>
+        </p:style>
+        <p:txBody>
+          <a:bodyPr wrap="square" rtlCol="0" anchor="ctr">
+            <a:noAutofit/>
+          </a:bodyPr>
+          <a:lstStyle/>
+          <a:p>
+            <a:pPr marL="0" marR="0" lvl="0" indent="0" algn="ctr" defTabSz="914400" rtl="0" eaLnBrk="1" fontAlgn="auto" latinLnBrk="0" hangingPunct="1">
+              <a:lnSpc>
+                <a:spcPct val="100000"/>
+              </a:lnSpc>
+              <a:spcBef>
+                <a:spcPts val="0"/>
+              </a:spcBef>
+              <a:spcAft>
+                <a:spcPts val="0"/>
+              </a:spcAft>
+              <a:buClrTx/>
+              <a:buSzTx/>
+              <a:buFontTx/>
+              <a:buNone/>
+              <a:tabLst/>
+              <a:defRPr/>
+            </a:pPr>
+            <a:endParaRPr kumimoji="0" lang="en-US" sz="1800" b="0" i="0" u="none" strike="noStrike" kern="1200" cap="none" spc="0" normalizeH="0" baseline="0" noProof="0" dirty="0">
+              <a:ln>
+                <a:noFill/>
+              </a:ln>
+              <a:solidFill>
+                <a:prstClr val="white"/>
+              </a:solidFill>
+              <a:effectLst/>
+              <a:uLnTx/>
+              <a:uFillTx/>
+              <a:latin typeface="Meiryo"/>
+              <a:ea typeface="+mn-ea"/>
+              <a:cs typeface="+mn-cs"/>
+            </a:endParaRPr>
+          </a:p>
+        </p:txBody>
+      </p:sp>
+      <p:sp>
+        <p:nvSpPr>
+          <p:cNvPr id="2" name="Заглавие 1">
+            <a:extLst>
+              <a:ext uri="{FF2B5EF4-FFF2-40B4-BE49-F238E27FC236}">
+                <a16:creationId xmlns:a16="http://schemas.microsoft.com/office/drawing/2014/main" id="{E49CB42F-2A5D-46C9-93F1-AEEA2C382E39}"/>
+              </a:ext>
+            </a:extLst>
+          </p:cNvPr>
+          <p:cNvSpPr>
+            <a:spLocks noGrp="1"/>
+          </p:cNvSpPr>
+          <p:nvPr>
+            <p:ph type="title"/>
+          </p:nvPr>
+        </p:nvSpPr>
+        <p:spPr>
+          <a:xfrm>
+            <a:off x="7093258" y="1045597"/>
+            <a:ext cx="4987631" cy="940108"/>
+          </a:xfrm>
+        </p:spPr>
+        <p:txBody>
+          <a:bodyPr anchor="b">
+            <a:normAutofit/>
+          </a:bodyPr>
+          <a:lstStyle/>
+          <a:p>
+            <a:r>
+              <a:rPr lang="en-US" sz="3600" dirty="0"/>
+              <a:t>Create migration</a:t>
+            </a:r>
+            <a:endParaRPr lang="bg-BG" sz="3600" dirty="0"/>
+          </a:p>
+        </p:txBody>
+      </p:sp>
+      <p:pic>
+        <p:nvPicPr>
+          <p:cNvPr id="4" name="Картина 3">
+            <a:extLst>
+              <a:ext uri="{FF2B5EF4-FFF2-40B4-BE49-F238E27FC236}">
+                <a16:creationId xmlns:a16="http://schemas.microsoft.com/office/drawing/2014/main" id="{8E551DB8-B27E-4D3C-B0F7-CDD935E56E35}"/>
+              </a:ext>
+            </a:extLst>
+          </p:cNvPr>
+          <p:cNvPicPr>
+            <a:picLocks noChangeAspect="1"/>
+          </p:cNvPicPr>
+          <p:nvPr/>
+        </p:nvPicPr>
+        <p:blipFill>
+          <a:blip r:embed="rId2"/>
+          <a:stretch>
+            <a:fillRect/>
+          </a:stretch>
+        </p:blipFill>
+        <p:spPr>
+          <a:xfrm>
+            <a:off x="111111" y="2150051"/>
+            <a:ext cx="6081613" cy="2341421"/>
+          </a:xfrm>
+          <a:prstGeom prst="rect">
+            <a:avLst/>
+          </a:prstGeom>
+        </p:spPr>
+      </p:pic>
+      <p:sp>
+        <p:nvSpPr>
+          <p:cNvPr id="3" name="Контейнер за съдържание 2">
+            <a:extLst>
+              <a:ext uri="{FF2B5EF4-FFF2-40B4-BE49-F238E27FC236}">
+                <a16:creationId xmlns:a16="http://schemas.microsoft.com/office/drawing/2014/main" id="{3E1AE3EB-D88D-4F8F-AD3E-D7C777558AA5}"/>
+              </a:ext>
+            </a:extLst>
+          </p:cNvPr>
+          <p:cNvSpPr>
+            <a:spLocks noGrp="1"/>
+          </p:cNvSpPr>
+          <p:nvPr>
+            <p:ph idx="1"/>
+          </p:nvPr>
+        </p:nvSpPr>
+        <p:spPr>
+          <a:xfrm>
+            <a:off x="6975558" y="2236304"/>
+            <a:ext cx="5223029" cy="2385392"/>
+          </a:xfrm>
+        </p:spPr>
+        <p:txBody>
+          <a:bodyPr>
+            <a:noAutofit/>
+          </a:bodyPr>
+          <a:lstStyle/>
+          <a:p>
+            <a:pPr marL="285750" indent="-285750">
+              <a:lnSpc>
+                <a:spcPct val="130000"/>
+              </a:lnSpc>
+              <a:buFont typeface="Wingdings" panose="05000000000000000000" pitchFamily="2" charset="2"/>
+              <a:buChar char="Ø"/>
+            </a:pPr>
+            <a:r>
+              <a:rPr lang="en-US" sz="2200" dirty="0"/>
+              <a:t>Open Package Manager Console</a:t>
+            </a:r>
+          </a:p>
+          <a:p>
+            <a:pPr marL="285750" indent="-285750">
+              <a:lnSpc>
+                <a:spcPct val="130000"/>
+              </a:lnSpc>
+              <a:buFont typeface="Wingdings" panose="05000000000000000000" pitchFamily="2" charset="2"/>
+              <a:buChar char="Ø"/>
+            </a:pPr>
+            <a:r>
+              <a:rPr lang="en-US" sz="2200" dirty="0"/>
+              <a:t>Select correct project (Data)</a:t>
+            </a:r>
+          </a:p>
+          <a:p>
+            <a:pPr marL="285750" indent="-285750">
+              <a:lnSpc>
+                <a:spcPct val="130000"/>
+              </a:lnSpc>
+              <a:buFont typeface="Wingdings" panose="05000000000000000000" pitchFamily="2" charset="2"/>
+              <a:buChar char="Ø"/>
+            </a:pPr>
+            <a:r>
+              <a:rPr lang="en-US" sz="2200" dirty="0"/>
+              <a:t>Add-migration </a:t>
+            </a:r>
+            <a:r>
+              <a:rPr lang="en-US" sz="2200" dirty="0" err="1"/>
+              <a:t>MigrationName</a:t>
+            </a:r>
+            <a:endParaRPr lang="bg-BG" sz="2200" dirty="0"/>
+          </a:p>
+          <a:p>
+            <a:pPr marL="285750" indent="-285750">
+              <a:lnSpc>
+                <a:spcPct val="130000"/>
+              </a:lnSpc>
+              <a:buFont typeface="Wingdings" panose="05000000000000000000" pitchFamily="2" charset="2"/>
+              <a:buChar char="Ø"/>
+            </a:pPr>
+            <a:r>
+              <a:rPr lang="en-US" sz="2200" dirty="0"/>
+              <a:t>View Migration</a:t>
+            </a:r>
+          </a:p>
+          <a:p>
+            <a:pPr marL="285750" indent="-285750">
+              <a:lnSpc>
+                <a:spcPct val="130000"/>
+              </a:lnSpc>
+              <a:buFont typeface="Wingdings" panose="05000000000000000000" pitchFamily="2" charset="2"/>
+              <a:buChar char="Ø"/>
+            </a:pPr>
+            <a:endParaRPr lang="en-US" sz="2200" dirty="0"/>
+          </a:p>
+          <a:p>
+            <a:pPr>
+              <a:lnSpc>
+                <a:spcPct val="130000"/>
+              </a:lnSpc>
+            </a:pPr>
+            <a:endParaRPr lang="bg-BG" sz="2200" dirty="0"/>
+          </a:p>
+        </p:txBody>
+      </p:sp>
+    </p:spTree>
+    <p:extLst>
+      <p:ext uri="{BB962C8B-B14F-4D97-AF65-F5344CB8AC3E}">
+        <p14:creationId xmlns:p14="http://schemas.microsoft.com/office/powerpoint/2010/main" val="1327105541"/>
+      </p:ext>
+    </p:extLst>
+  </p:cSld>
+  <p:clrMapOvr>
+    <a:masterClrMapping/>
+  </p:clrMapOvr>
+</p:sld>
+</file>
+
+<file path=ppt/slides/slide11.xml><?xml version="1.0" encoding="utf-8"?>
+<p:sld xmlns:a="http://schemas.openxmlformats.org/drawingml/2006/main" xmlns:r="http://schemas.openxmlformats.org/officeDocument/2006/relationships" xmlns:p="http://schemas.openxmlformats.org/presentationml/2006/main">
+  <p:cSld>
+    <p:bg>
+      <p:bgPr>
+        <a:solidFill>
+          <a:schemeClr val="bg2"/>
+        </a:solidFill>
+        <a:effectLst/>
+      </p:bgPr>
+    </p:bg>
+    <p:spTree>
+      <p:nvGrpSpPr>
+        <p:cNvPr id="1" name=""/>
+        <p:cNvGrpSpPr/>
+        <p:nvPr/>
+      </p:nvGrpSpPr>
+      <p:grpSpPr>
+        <a:xfrm>
+          <a:off x="0" y="0"/>
+          <a:ext cx="0" cy="0"/>
+          <a:chOff x="0" y="0"/>
+          <a:chExt cx="0" cy="0"/>
+        </a:xfrm>
+      </p:grpSpPr>
+      <p:sp useBgFill="1">
+        <p:nvSpPr>
+          <p:cNvPr id="9" name="Rectangle 8">
+            <a:extLst>
+              <a:ext uri="{FF2B5EF4-FFF2-40B4-BE49-F238E27FC236}">
                 <a16:creationId xmlns:a16="http://schemas.microsoft.com/office/drawing/2014/main" id="{47FC6A8B-34F9-40FB-AA2D-E34168F52850}"/>
               </a:ext>
               <a:ext uri="{C183D7F6-B498-43B3-948B-1728B52AA6E4}">
@@ -12199,7 +13140,7 @@
 </p:sld>
 </file>
 
-<file path=ppt/slides/slide11.xml><?xml version="1.0" encoding="utf-8"?>
+<file path=ppt/slides/slide12.xml><?xml version="1.0" encoding="utf-8"?>
 <p:sld xmlns:a="http://schemas.openxmlformats.org/drawingml/2006/main" xmlns:r="http://schemas.openxmlformats.org/officeDocument/2006/relationships" xmlns:p="http://schemas.openxmlformats.org/presentationml/2006/main">
   <p:cSld>
     <p:bg>
@@ -14187,7 +15128,7 @@
 </p:sld>
 </file>
 
-<file path=ppt/slides/slide12.xml><?xml version="1.0" encoding="utf-8"?>
+<file path=ppt/slides/slide13.xml><?xml version="1.0" encoding="utf-8"?>
 <p:sld xmlns:a="http://schemas.openxmlformats.org/drawingml/2006/main" xmlns:r="http://schemas.openxmlformats.org/officeDocument/2006/relationships" xmlns:p="http://schemas.openxmlformats.org/presentationml/2006/main">
   <p:cSld>
     <p:bg>
@@ -16128,7 +17069,7 @@
 </p:sld>
 </file>
 
-<file path=ppt/slides/slide13.xml><?xml version="1.0" encoding="utf-8"?>
+<file path=ppt/slides/slide14.xml><?xml version="1.0" encoding="utf-8"?>
 <p:sld xmlns:a="http://schemas.openxmlformats.org/drawingml/2006/main" xmlns:r="http://schemas.openxmlformats.org/officeDocument/2006/relationships" xmlns:p="http://schemas.openxmlformats.org/presentationml/2006/main">
   <p:cSld>
     <p:bg>
@@ -21162,6 +22103,898 @@
       </p:grpSpPr>
       <p:sp useBgFill="1">
         <p:nvSpPr>
+          <p:cNvPr id="10" name="Rectangle 9">
+            <a:extLst>
+              <a:ext uri="{FF2B5EF4-FFF2-40B4-BE49-F238E27FC236}">
+                <a16:creationId xmlns:a16="http://schemas.microsoft.com/office/drawing/2014/main" id="{8181FC64-B306-4821-98E2-780662EFC486}"/>
+              </a:ext>
+              <a:ext uri="{C183D7F6-B498-43B3-948B-1728B52AA6E4}">
+                <adec:decorative xmlns:adec="http://schemas.microsoft.com/office/drawing/2017/decorative" val="1"/>
+              </a:ext>
+            </a:extLst>
+          </p:cNvPr>
+          <p:cNvSpPr>
+            <a:spLocks noGrp="1" noRot="1" noChangeAspect="1" noMove="1" noResize="1" noEditPoints="1" noAdjustHandles="1" noChangeArrowheads="1" noChangeShapeType="1" noTextEdit="1"/>
+          </p:cNvSpPr>
+          <p:nvPr>
+            <p:extLst>
+              <p:ext uri="{386F3935-93C4-4BCD-93E2-E3B085C9AB24}">
+                <p16:designElem xmlns:p16="http://schemas.microsoft.com/office/powerpoint/2015/main" val="1"/>
+              </p:ext>
+            </p:extLst>
+          </p:nvPr>
+        </p:nvSpPr>
+        <p:spPr>
+          <a:xfrm>
+            <a:off x="305" y="0"/>
+            <a:ext cx="12191695" cy="6858000"/>
+          </a:xfrm>
+          <a:prstGeom prst="rect">
+            <a:avLst/>
+          </a:prstGeom>
+          <a:ln>
+            <a:noFill/>
+          </a:ln>
+        </p:spPr>
+        <p:style>
+          <a:lnRef idx="2">
+            <a:schemeClr val="accent1">
+              <a:shade val="50000"/>
+            </a:schemeClr>
+          </a:lnRef>
+          <a:fillRef idx="1">
+            <a:schemeClr val="accent1"/>
+          </a:fillRef>
+          <a:effectRef idx="0">
+            <a:schemeClr val="accent1"/>
+          </a:effectRef>
+          <a:fontRef idx="minor">
+            <a:schemeClr val="lt1"/>
+          </a:fontRef>
+        </p:style>
+        <p:txBody>
+          <a:bodyPr rtlCol="0" anchor="ctr"/>
+          <a:lstStyle/>
+          <a:p>
+            <a:pPr marL="0" marR="0" lvl="0" indent="0" algn="ctr" defTabSz="457200" rtl="0" eaLnBrk="1" fontAlgn="auto" latinLnBrk="0" hangingPunct="1">
+              <a:lnSpc>
+                <a:spcPct val="100000"/>
+              </a:lnSpc>
+              <a:spcBef>
+                <a:spcPts val="0"/>
+              </a:spcBef>
+              <a:spcAft>
+                <a:spcPts val="0"/>
+              </a:spcAft>
+              <a:buClrTx/>
+              <a:buSzTx/>
+              <a:buFontTx/>
+              <a:buNone/>
+              <a:tabLst/>
+              <a:defRPr/>
+            </a:pPr>
+            <a:endParaRPr kumimoji="0" lang="en-US" sz="1800" b="0" i="0" u="none" strike="noStrike" kern="1200" cap="none" spc="0" normalizeH="0" baseline="0" noProof="0" dirty="0">
+              <a:ln>
+                <a:noFill/>
+              </a:ln>
+              <a:solidFill>
+                <a:prstClr val="white"/>
+              </a:solidFill>
+              <a:effectLst/>
+              <a:uLnTx/>
+              <a:uFillTx/>
+              <a:latin typeface="Meiryo"/>
+              <a:ea typeface="+mn-ea"/>
+              <a:cs typeface="+mn-cs"/>
+            </a:endParaRPr>
+          </a:p>
+        </p:txBody>
+      </p:sp>
+      <p:sp>
+        <p:nvSpPr>
+          <p:cNvPr id="12" name="Freeform: Shape 11">
+            <a:extLst>
+              <a:ext uri="{FF2B5EF4-FFF2-40B4-BE49-F238E27FC236}">
+                <a16:creationId xmlns:a16="http://schemas.microsoft.com/office/drawing/2014/main" id="{BC0385E9-02B2-4941-889A-EAD43F5BB0A3}"/>
+              </a:ext>
+              <a:ext uri="{C183D7F6-B498-43B3-948B-1728B52AA6E4}">
+                <adec:decorative xmlns:adec="http://schemas.microsoft.com/office/drawing/2017/decorative" val="1"/>
+              </a:ext>
+            </a:extLst>
+          </p:cNvPr>
+          <p:cNvSpPr>
+            <a:spLocks noGrp="1" noRot="1" noChangeAspect="1" noMove="1" noResize="1" noEditPoints="1" noAdjustHandles="1" noChangeArrowheads="1" noChangeShapeType="1" noTextEdit="1"/>
+          </p:cNvSpPr>
+          <p:nvPr>
+            <p:extLst>
+              <p:ext uri="{386F3935-93C4-4BCD-93E2-E3B085C9AB24}">
+                <p16:designElem xmlns:p16="http://schemas.microsoft.com/office/powerpoint/2015/main" val="1"/>
+              </p:ext>
+            </p:extLst>
+          </p:nvPr>
+        </p:nvSpPr>
+        <p:spPr>
+          <a:xfrm flipH="1">
+            <a:off x="6736139" y="0"/>
+            <a:ext cx="5455860" cy="6858000"/>
+          </a:xfrm>
+          <a:custGeom>
+            <a:avLst/>
+            <a:gdLst>
+              <a:gd name="connsiteX0" fmla="*/ 3832837 w 5455860"/>
+              <a:gd name="connsiteY0" fmla="*/ 0 h 6858000"/>
+              <a:gd name="connsiteX1" fmla="*/ 2739604 w 5455860"/>
+              <a:gd name="connsiteY1" fmla="*/ 0 h 6858000"/>
+              <a:gd name="connsiteX2" fmla="*/ 1959438 w 5455860"/>
+              <a:gd name="connsiteY2" fmla="*/ 0 h 6858000"/>
+              <a:gd name="connsiteX3" fmla="*/ 1895061 w 5455860"/>
+              <a:gd name="connsiteY3" fmla="*/ 0 h 6858000"/>
+              <a:gd name="connsiteX4" fmla="*/ 249909 w 5455860"/>
+              <a:gd name="connsiteY4" fmla="*/ 0 h 6858000"/>
+              <a:gd name="connsiteX5" fmla="*/ 0 w 5455860"/>
+              <a:gd name="connsiteY5" fmla="*/ 0 h 6858000"/>
+              <a:gd name="connsiteX6" fmla="*/ 0 w 5455860"/>
+              <a:gd name="connsiteY6" fmla="*/ 6858000 h 6858000"/>
+              <a:gd name="connsiteX7" fmla="*/ 249909 w 5455860"/>
+              <a:gd name="connsiteY7" fmla="*/ 6858000 h 6858000"/>
+              <a:gd name="connsiteX8" fmla="*/ 1895061 w 5455860"/>
+              <a:gd name="connsiteY8" fmla="*/ 6858000 h 6858000"/>
+              <a:gd name="connsiteX9" fmla="*/ 1959438 w 5455860"/>
+              <a:gd name="connsiteY9" fmla="*/ 6858000 h 6858000"/>
+              <a:gd name="connsiteX10" fmla="*/ 2739604 w 5455860"/>
+              <a:gd name="connsiteY10" fmla="*/ 6858000 h 6858000"/>
+              <a:gd name="connsiteX11" fmla="*/ 2953106 w 5455860"/>
+              <a:gd name="connsiteY11" fmla="*/ 6858000 h 6858000"/>
+              <a:gd name="connsiteX12" fmla="*/ 3064862 w 5455860"/>
+              <a:gd name="connsiteY12" fmla="*/ 6780599 h 6858000"/>
+              <a:gd name="connsiteX13" fmla="*/ 3581510 w 5455860"/>
+              <a:gd name="connsiteY13" fmla="*/ 6374814 h 6858000"/>
+              <a:gd name="connsiteX14" fmla="*/ 5455860 w 5455860"/>
+              <a:gd name="connsiteY14" fmla="*/ 3621656 h 6858000"/>
+              <a:gd name="connsiteX15" fmla="*/ 3854961 w 5455860"/>
+              <a:gd name="connsiteY15" fmla="*/ 14997 h 6858000"/>
+            </a:gdLst>
+            <a:ahLst/>
+            <a:cxnLst>
+              <a:cxn ang="0">
+                <a:pos x="connsiteX0" y="connsiteY0"/>
+              </a:cxn>
+              <a:cxn ang="0">
+                <a:pos x="connsiteX1" y="connsiteY1"/>
+              </a:cxn>
+              <a:cxn ang="0">
+                <a:pos x="connsiteX2" y="connsiteY2"/>
+              </a:cxn>
+              <a:cxn ang="0">
+                <a:pos x="connsiteX3" y="connsiteY3"/>
+              </a:cxn>
+              <a:cxn ang="0">
+                <a:pos x="connsiteX4" y="connsiteY4"/>
+              </a:cxn>
+              <a:cxn ang="0">
+                <a:pos x="connsiteX5" y="connsiteY5"/>
+              </a:cxn>
+              <a:cxn ang="0">
+                <a:pos x="connsiteX6" y="connsiteY6"/>
+              </a:cxn>
+              <a:cxn ang="0">
+                <a:pos x="connsiteX7" y="connsiteY7"/>
+              </a:cxn>
+              <a:cxn ang="0">
+                <a:pos x="connsiteX8" y="connsiteY8"/>
+              </a:cxn>
+              <a:cxn ang="0">
+                <a:pos x="connsiteX9" y="connsiteY9"/>
+              </a:cxn>
+              <a:cxn ang="0">
+                <a:pos x="connsiteX10" y="connsiteY10"/>
+              </a:cxn>
+              <a:cxn ang="0">
+                <a:pos x="connsiteX11" y="connsiteY11"/>
+              </a:cxn>
+              <a:cxn ang="0">
+                <a:pos x="connsiteX12" y="connsiteY12"/>
+              </a:cxn>
+              <a:cxn ang="0">
+                <a:pos x="connsiteX13" y="connsiteY13"/>
+              </a:cxn>
+              <a:cxn ang="0">
+                <a:pos x="connsiteX14" y="connsiteY14"/>
+              </a:cxn>
+              <a:cxn ang="0">
+                <a:pos x="connsiteX15" y="connsiteY15"/>
+              </a:cxn>
+            </a:cxnLst>
+            <a:rect l="l" t="t" r="r" b="b"/>
+            <a:pathLst>
+              <a:path w="5455860" h="6858000">
+                <a:moveTo>
+                  <a:pt x="3832837" y="0"/>
+                </a:moveTo>
+                <a:lnTo>
+                  <a:pt x="2739604" y="0"/>
+                </a:lnTo>
+                <a:lnTo>
+                  <a:pt x="1959438" y="0"/>
+                </a:lnTo>
+                <a:lnTo>
+                  <a:pt x="1895061" y="0"/>
+                </a:lnTo>
+                <a:lnTo>
+                  <a:pt x="249909" y="0"/>
+                </a:lnTo>
+                <a:lnTo>
+                  <a:pt x="0" y="0"/>
+                </a:lnTo>
+                <a:lnTo>
+                  <a:pt x="0" y="6858000"/>
+                </a:lnTo>
+                <a:lnTo>
+                  <a:pt x="249909" y="6858000"/>
+                </a:lnTo>
+                <a:lnTo>
+                  <a:pt x="1895061" y="6858000"/>
+                </a:lnTo>
+                <a:lnTo>
+                  <a:pt x="1959438" y="6858000"/>
+                </a:lnTo>
+                <a:lnTo>
+                  <a:pt x="2739604" y="6858000"/>
+                </a:lnTo>
+                <a:lnTo>
+                  <a:pt x="2953106" y="6858000"/>
+                </a:lnTo>
+                <a:lnTo>
+                  <a:pt x="3064862" y="6780599"/>
+                </a:lnTo>
+                <a:cubicBezTo>
+                  <a:pt x="3238680" y="6653108"/>
+                  <a:pt x="3409307" y="6515397"/>
+                  <a:pt x="3581510" y="6374814"/>
+                </a:cubicBezTo>
+                <a:cubicBezTo>
+                  <a:pt x="4527135" y="5602839"/>
+                  <a:pt x="5455860" y="4969131"/>
+                  <a:pt x="5455860" y="3621656"/>
+                </a:cubicBezTo>
+                <a:cubicBezTo>
+                  <a:pt x="5455860" y="2093192"/>
+                  <a:pt x="4882124" y="754641"/>
+                  <a:pt x="3854961" y="14997"/>
+                </a:cubicBezTo>
+                <a:close/>
+              </a:path>
+            </a:pathLst>
+          </a:custGeom>
+          <a:solidFill>
+            <a:schemeClr val="bg1">
+              <a:alpha val="60000"/>
+            </a:schemeClr>
+          </a:solidFill>
+          <a:ln>
+            <a:noFill/>
+          </a:ln>
+        </p:spPr>
+        <p:style>
+          <a:lnRef idx="2">
+            <a:schemeClr val="accent1">
+              <a:shade val="50000"/>
+            </a:schemeClr>
+          </a:lnRef>
+          <a:fillRef idx="1">
+            <a:schemeClr val="accent1"/>
+          </a:fillRef>
+          <a:effectRef idx="0">
+            <a:schemeClr val="accent1"/>
+          </a:effectRef>
+          <a:fontRef idx="minor">
+            <a:schemeClr val="lt1"/>
+          </a:fontRef>
+        </p:style>
+        <p:txBody>
+          <a:bodyPr wrap="square" rtlCol="0" anchor="ctr">
+            <a:noAutofit/>
+          </a:bodyPr>
+          <a:lstStyle/>
+          <a:p>
+            <a:pPr algn="ctr"/>
+            <a:endParaRPr lang="en-US" dirty="0"/>
+          </a:p>
+        </p:txBody>
+      </p:sp>
+      <p:sp>
+        <p:nvSpPr>
+          <p:cNvPr id="14" name="Freeform: Shape 13">
+            <a:extLst>
+              <a:ext uri="{FF2B5EF4-FFF2-40B4-BE49-F238E27FC236}">
+                <a16:creationId xmlns:a16="http://schemas.microsoft.com/office/drawing/2014/main" id="{829A1E2C-5AC8-40FC-99E9-832069D39792}"/>
+              </a:ext>
+              <a:ext uri="{C183D7F6-B498-43B3-948B-1728B52AA6E4}">
+                <adec:decorative xmlns:adec="http://schemas.microsoft.com/office/drawing/2017/decorative" val="1"/>
+              </a:ext>
+            </a:extLst>
+          </p:cNvPr>
+          <p:cNvSpPr>
+            <a:spLocks noGrp="1" noRot="1" noChangeAspect="1" noMove="1" noResize="1" noEditPoints="1" noAdjustHandles="1" noChangeArrowheads="1" noChangeShapeType="1" noTextEdit="1"/>
+          </p:cNvSpPr>
+          <p:nvPr>
+            <p:extLst>
+              <p:ext uri="{386F3935-93C4-4BCD-93E2-E3B085C9AB24}">
+                <p16:designElem xmlns:p16="http://schemas.microsoft.com/office/powerpoint/2015/main" val="1"/>
+              </p:ext>
+            </p:extLst>
+          </p:nvPr>
+        </p:nvSpPr>
+        <p:spPr>
+          <a:xfrm flipH="1">
+            <a:off x="6255864" y="0"/>
+            <a:ext cx="2529723" cy="6858000"/>
+          </a:xfrm>
+          <a:custGeom>
+            <a:avLst/>
+            <a:gdLst>
+              <a:gd name="connsiteX0" fmla="*/ 1258269 w 2529723"/>
+              <a:gd name="connsiteY0" fmla="*/ 0 h 6858000"/>
+              <a:gd name="connsiteX1" fmla="*/ 1275627 w 2529723"/>
+              <a:gd name="connsiteY1" fmla="*/ 0 h 6858000"/>
+              <a:gd name="connsiteX2" fmla="*/ 1302560 w 2529723"/>
+              <a:gd name="connsiteY2" fmla="*/ 24338 h 6858000"/>
+              <a:gd name="connsiteX3" fmla="*/ 2522825 w 2529723"/>
+              <a:gd name="connsiteY3" fmla="*/ 3678515 h 6858000"/>
+              <a:gd name="connsiteX4" fmla="*/ 557500 w 2529723"/>
+              <a:gd name="connsiteY4" fmla="*/ 6451411 h 6858000"/>
+              <a:gd name="connsiteX5" fmla="*/ 32482 w 2529723"/>
+              <a:gd name="connsiteY5" fmla="*/ 6849373 h 6858000"/>
+              <a:gd name="connsiteX6" fmla="*/ 19531 w 2529723"/>
+              <a:gd name="connsiteY6" fmla="*/ 6858000 h 6858000"/>
+              <a:gd name="connsiteX7" fmla="*/ 0 w 2529723"/>
+              <a:gd name="connsiteY7" fmla="*/ 6858000 h 6858000"/>
+              <a:gd name="connsiteX8" fmla="*/ 14202 w 2529723"/>
+              <a:gd name="connsiteY8" fmla="*/ 6848540 h 6858000"/>
+              <a:gd name="connsiteX9" fmla="*/ 539221 w 2529723"/>
+              <a:gd name="connsiteY9" fmla="*/ 6450578 h 6858000"/>
+              <a:gd name="connsiteX10" fmla="*/ 2504546 w 2529723"/>
+              <a:gd name="connsiteY10" fmla="*/ 3677682 h 6858000"/>
+              <a:gd name="connsiteX11" fmla="*/ 1284280 w 2529723"/>
+              <a:gd name="connsiteY11" fmla="*/ 23504 h 6858000"/>
+            </a:gdLst>
+            <a:ahLst/>
+            <a:cxnLst>
+              <a:cxn ang="0">
+                <a:pos x="connsiteX0" y="connsiteY0"/>
+              </a:cxn>
+              <a:cxn ang="0">
+                <a:pos x="connsiteX1" y="connsiteY1"/>
+              </a:cxn>
+              <a:cxn ang="0">
+                <a:pos x="connsiteX2" y="connsiteY2"/>
+              </a:cxn>
+              <a:cxn ang="0">
+                <a:pos x="connsiteX3" y="connsiteY3"/>
+              </a:cxn>
+              <a:cxn ang="0">
+                <a:pos x="connsiteX4" y="connsiteY4"/>
+              </a:cxn>
+              <a:cxn ang="0">
+                <a:pos x="connsiteX5" y="connsiteY5"/>
+              </a:cxn>
+              <a:cxn ang="0">
+                <a:pos x="connsiteX6" y="connsiteY6"/>
+              </a:cxn>
+              <a:cxn ang="0">
+                <a:pos x="connsiteX7" y="connsiteY7"/>
+              </a:cxn>
+              <a:cxn ang="0">
+                <a:pos x="connsiteX8" y="connsiteY8"/>
+              </a:cxn>
+              <a:cxn ang="0">
+                <a:pos x="connsiteX9" y="connsiteY9"/>
+              </a:cxn>
+              <a:cxn ang="0">
+                <a:pos x="connsiteX10" y="connsiteY10"/>
+              </a:cxn>
+              <a:cxn ang="0">
+                <a:pos x="connsiteX11" y="connsiteY11"/>
+              </a:cxn>
+            </a:cxnLst>
+            <a:rect l="l" t="t" r="r" b="b"/>
+            <a:pathLst>
+              <a:path w="2529723" h="6858000">
+                <a:moveTo>
+                  <a:pt x="1258269" y="0"/>
+                </a:moveTo>
+                <a:lnTo>
+                  <a:pt x="1275627" y="0"/>
+                </a:lnTo>
+                <a:lnTo>
+                  <a:pt x="1302560" y="24338"/>
+                </a:lnTo>
+                <a:cubicBezTo>
+                  <a:pt x="2156831" y="855667"/>
+                  <a:pt x="2590622" y="2191755"/>
+                  <a:pt x="2522825" y="3678515"/>
+                </a:cubicBezTo>
+                <a:cubicBezTo>
+                  <a:pt x="2459072" y="5076606"/>
+                  <a:pt x="1519830" y="5692656"/>
+                  <a:pt x="557500" y="6451411"/>
+                </a:cubicBezTo>
+                <a:cubicBezTo>
+                  <a:pt x="382255" y="6589587"/>
+                  <a:pt x="208689" y="6724853"/>
+                  <a:pt x="32482" y="6849373"/>
+                </a:cubicBezTo>
+                <a:lnTo>
+                  <a:pt x="19531" y="6858000"/>
+                </a:lnTo>
+                <a:lnTo>
+                  <a:pt x="0" y="6858000"/>
+                </a:lnTo>
+                <a:lnTo>
+                  <a:pt x="14202" y="6848540"/>
+                </a:lnTo>
+                <a:cubicBezTo>
+                  <a:pt x="190409" y="6724020"/>
+                  <a:pt x="363976" y="6588754"/>
+                  <a:pt x="539221" y="6450578"/>
+                </a:cubicBezTo>
+                <a:cubicBezTo>
+                  <a:pt x="1501550" y="5691822"/>
+                  <a:pt x="2440792" y="5075773"/>
+                  <a:pt x="2504546" y="3677682"/>
+                </a:cubicBezTo>
+                <a:cubicBezTo>
+                  <a:pt x="2572343" y="2190921"/>
+                  <a:pt x="2138551" y="854834"/>
+                  <a:pt x="1284280" y="23504"/>
+                </a:cubicBezTo>
+                <a:close/>
+              </a:path>
+            </a:pathLst>
+          </a:custGeom>
+          <a:solidFill>
+            <a:srgbClr val="FFFFFF"/>
+          </a:solidFill>
+          <a:ln>
+            <a:noFill/>
+          </a:ln>
+        </p:spPr>
+        <p:style>
+          <a:lnRef idx="2">
+            <a:schemeClr val="accent1">
+              <a:shade val="50000"/>
+            </a:schemeClr>
+          </a:lnRef>
+          <a:fillRef idx="1">
+            <a:schemeClr val="accent1"/>
+          </a:fillRef>
+          <a:effectRef idx="0">
+            <a:schemeClr val="accent1"/>
+          </a:effectRef>
+          <a:fontRef idx="minor">
+            <a:schemeClr val="lt1"/>
+          </a:fontRef>
+        </p:style>
+        <p:txBody>
+          <a:bodyPr wrap="square" rtlCol="0" anchor="ctr">
+            <a:noAutofit/>
+          </a:bodyPr>
+          <a:lstStyle/>
+          <a:p>
+            <a:pPr marL="0" marR="0" lvl="0" indent="0" algn="ctr" defTabSz="457200" rtl="0" eaLnBrk="1" fontAlgn="auto" latinLnBrk="0" hangingPunct="1">
+              <a:lnSpc>
+                <a:spcPct val="100000"/>
+              </a:lnSpc>
+              <a:spcBef>
+                <a:spcPts val="0"/>
+              </a:spcBef>
+              <a:spcAft>
+                <a:spcPts val="0"/>
+              </a:spcAft>
+              <a:buClrTx/>
+              <a:buSzTx/>
+              <a:buFontTx/>
+              <a:buNone/>
+              <a:tabLst/>
+              <a:defRPr/>
+            </a:pPr>
+            <a:endParaRPr kumimoji="0" lang="en-US" sz="1800" b="0" i="0" u="none" strike="noStrike" kern="1200" cap="none" spc="0" normalizeH="0" baseline="0" noProof="0" dirty="0">
+              <a:ln>
+                <a:noFill/>
+              </a:ln>
+              <a:solidFill>
+                <a:prstClr val="white"/>
+              </a:solidFill>
+              <a:effectLst/>
+              <a:uLnTx/>
+              <a:uFillTx/>
+              <a:latin typeface="Meiryo"/>
+              <a:ea typeface="+mn-ea"/>
+              <a:cs typeface="+mn-cs"/>
+            </a:endParaRPr>
+          </a:p>
+        </p:txBody>
+      </p:sp>
+      <p:sp>
+        <p:nvSpPr>
+          <p:cNvPr id="16" name="Freeform: Shape 15">
+            <a:extLst>
+              <a:ext uri="{FF2B5EF4-FFF2-40B4-BE49-F238E27FC236}">
+                <a16:creationId xmlns:a16="http://schemas.microsoft.com/office/drawing/2014/main" id="{55C54A75-E44A-4147-B9D0-FF46CFD31612}"/>
+              </a:ext>
+              <a:ext uri="{C183D7F6-B498-43B3-948B-1728B52AA6E4}">
+                <adec:decorative xmlns:adec="http://schemas.microsoft.com/office/drawing/2017/decorative" val="1"/>
+              </a:ext>
+            </a:extLst>
+          </p:cNvPr>
+          <p:cNvSpPr>
+            <a:spLocks noGrp="1" noRot="1" noChangeAspect="1" noMove="1" noResize="1" noEditPoints="1" noAdjustHandles="1" noChangeArrowheads="1" noChangeShapeType="1" noTextEdit="1"/>
+          </p:cNvSpPr>
+          <p:nvPr>
+            <p:extLst>
+              <p:ext uri="{386F3935-93C4-4BCD-93E2-E3B085C9AB24}">
+                <p16:designElem xmlns:p16="http://schemas.microsoft.com/office/powerpoint/2015/main" val="1"/>
+              </p:ext>
+            </p:extLst>
+          </p:nvPr>
+        </p:nvSpPr>
+        <p:spPr>
+          <a:xfrm flipH="1">
+            <a:off x="6469160" y="0"/>
+            <a:ext cx="2536434" cy="6858000"/>
+          </a:xfrm>
+          <a:custGeom>
+            <a:avLst/>
+            <a:gdLst>
+              <a:gd name="connsiteX0" fmla="*/ 879731 w 2536434"/>
+              <a:gd name="connsiteY0" fmla="*/ 0 h 6858000"/>
+              <a:gd name="connsiteX1" fmla="*/ 913411 w 2536434"/>
+              <a:gd name="connsiteY1" fmla="*/ 0 h 6858000"/>
+              <a:gd name="connsiteX2" fmla="*/ 935535 w 2536434"/>
+              <a:gd name="connsiteY2" fmla="*/ 14997 h 6858000"/>
+              <a:gd name="connsiteX3" fmla="*/ 2536434 w 2536434"/>
+              <a:gd name="connsiteY3" fmla="*/ 3621656 h 6858000"/>
+              <a:gd name="connsiteX4" fmla="*/ 662084 w 2536434"/>
+              <a:gd name="connsiteY4" fmla="*/ 6374814 h 6858000"/>
+              <a:gd name="connsiteX5" fmla="*/ 145436 w 2536434"/>
+              <a:gd name="connsiteY5" fmla="*/ 6780599 h 6858000"/>
+              <a:gd name="connsiteX6" fmla="*/ 33680 w 2536434"/>
+              <a:gd name="connsiteY6" fmla="*/ 6858000 h 6858000"/>
+              <a:gd name="connsiteX7" fmla="*/ 0 w 2536434"/>
+              <a:gd name="connsiteY7" fmla="*/ 6858000 h 6858000"/>
+              <a:gd name="connsiteX8" fmla="*/ 111756 w 2536434"/>
+              <a:gd name="connsiteY8" fmla="*/ 6780599 h 6858000"/>
+              <a:gd name="connsiteX9" fmla="*/ 628404 w 2536434"/>
+              <a:gd name="connsiteY9" fmla="*/ 6374814 h 6858000"/>
+              <a:gd name="connsiteX10" fmla="*/ 2502754 w 2536434"/>
+              <a:gd name="connsiteY10" fmla="*/ 3621656 h 6858000"/>
+              <a:gd name="connsiteX11" fmla="*/ 901855 w 2536434"/>
+              <a:gd name="connsiteY11" fmla="*/ 14997 h 6858000"/>
+            </a:gdLst>
+            <a:ahLst/>
+            <a:cxnLst>
+              <a:cxn ang="0">
+                <a:pos x="connsiteX0" y="connsiteY0"/>
+              </a:cxn>
+              <a:cxn ang="0">
+                <a:pos x="connsiteX1" y="connsiteY1"/>
+              </a:cxn>
+              <a:cxn ang="0">
+                <a:pos x="connsiteX2" y="connsiteY2"/>
+              </a:cxn>
+              <a:cxn ang="0">
+                <a:pos x="connsiteX3" y="connsiteY3"/>
+              </a:cxn>
+              <a:cxn ang="0">
+                <a:pos x="connsiteX4" y="connsiteY4"/>
+              </a:cxn>
+              <a:cxn ang="0">
+                <a:pos x="connsiteX5" y="connsiteY5"/>
+              </a:cxn>
+              <a:cxn ang="0">
+                <a:pos x="connsiteX6" y="connsiteY6"/>
+              </a:cxn>
+              <a:cxn ang="0">
+                <a:pos x="connsiteX7" y="connsiteY7"/>
+              </a:cxn>
+              <a:cxn ang="0">
+                <a:pos x="connsiteX8" y="connsiteY8"/>
+              </a:cxn>
+              <a:cxn ang="0">
+                <a:pos x="connsiteX9" y="connsiteY9"/>
+              </a:cxn>
+              <a:cxn ang="0">
+                <a:pos x="connsiteX10" y="connsiteY10"/>
+              </a:cxn>
+              <a:cxn ang="0">
+                <a:pos x="connsiteX11" y="connsiteY11"/>
+              </a:cxn>
+            </a:cxnLst>
+            <a:rect l="l" t="t" r="r" b="b"/>
+            <a:pathLst>
+              <a:path w="2536434" h="6858000">
+                <a:moveTo>
+                  <a:pt x="879731" y="0"/>
+                </a:moveTo>
+                <a:lnTo>
+                  <a:pt x="913411" y="0"/>
+                </a:lnTo>
+                <a:lnTo>
+                  <a:pt x="935535" y="14997"/>
+                </a:lnTo>
+                <a:cubicBezTo>
+                  <a:pt x="1962698" y="754641"/>
+                  <a:pt x="2536434" y="2093192"/>
+                  <a:pt x="2536434" y="3621656"/>
+                </a:cubicBezTo>
+                <a:cubicBezTo>
+                  <a:pt x="2536434" y="4969131"/>
+                  <a:pt x="1607709" y="5602839"/>
+                  <a:pt x="662084" y="6374814"/>
+                </a:cubicBezTo>
+                <a:cubicBezTo>
+                  <a:pt x="489881" y="6515397"/>
+                  <a:pt x="319254" y="6653108"/>
+                  <a:pt x="145436" y="6780599"/>
+                </a:cubicBezTo>
+                <a:lnTo>
+                  <a:pt x="33680" y="6858000"/>
+                </a:lnTo>
+                <a:lnTo>
+                  <a:pt x="0" y="6858000"/>
+                </a:lnTo>
+                <a:lnTo>
+                  <a:pt x="111756" y="6780599"/>
+                </a:lnTo>
+                <a:cubicBezTo>
+                  <a:pt x="285574" y="6653108"/>
+                  <a:pt x="456201" y="6515397"/>
+                  <a:pt x="628404" y="6374814"/>
+                </a:cubicBezTo>
+                <a:cubicBezTo>
+                  <a:pt x="1574029" y="5602839"/>
+                  <a:pt x="2502754" y="4969131"/>
+                  <a:pt x="2502754" y="3621656"/>
+                </a:cubicBezTo>
+                <a:cubicBezTo>
+                  <a:pt x="2502754" y="2093192"/>
+                  <a:pt x="1929018" y="754641"/>
+                  <a:pt x="901855" y="14997"/>
+                </a:cubicBezTo>
+                <a:close/>
+              </a:path>
+            </a:pathLst>
+          </a:custGeom>
+          <a:solidFill>
+            <a:srgbClr val="FFFFFF"/>
+          </a:solidFill>
+          <a:ln>
+            <a:noFill/>
+          </a:ln>
+        </p:spPr>
+        <p:style>
+          <a:lnRef idx="2">
+            <a:schemeClr val="accent1">
+              <a:shade val="50000"/>
+            </a:schemeClr>
+          </a:lnRef>
+          <a:fillRef idx="1">
+            <a:schemeClr val="accent1"/>
+          </a:fillRef>
+          <a:effectRef idx="0">
+            <a:schemeClr val="accent1"/>
+          </a:effectRef>
+          <a:fontRef idx="minor">
+            <a:schemeClr val="lt1"/>
+          </a:fontRef>
+        </p:style>
+        <p:txBody>
+          <a:bodyPr wrap="square" rtlCol="0" anchor="ctr">
+            <a:noAutofit/>
+          </a:bodyPr>
+          <a:lstStyle/>
+          <a:p>
+            <a:pPr marL="0" marR="0" lvl="0" indent="0" algn="ctr" defTabSz="914400" rtl="0" eaLnBrk="1" fontAlgn="auto" latinLnBrk="0" hangingPunct="1">
+              <a:lnSpc>
+                <a:spcPct val="100000"/>
+              </a:lnSpc>
+              <a:spcBef>
+                <a:spcPts val="0"/>
+              </a:spcBef>
+              <a:spcAft>
+                <a:spcPts val="0"/>
+              </a:spcAft>
+              <a:buClrTx/>
+              <a:buSzTx/>
+              <a:buFontTx/>
+              <a:buNone/>
+              <a:tabLst/>
+              <a:defRPr/>
+            </a:pPr>
+            <a:endParaRPr kumimoji="0" lang="en-US" sz="1800" b="0" i="0" u="none" strike="noStrike" kern="1200" cap="none" spc="0" normalizeH="0" baseline="0" noProof="0" dirty="0">
+              <a:ln>
+                <a:noFill/>
+              </a:ln>
+              <a:solidFill>
+                <a:prstClr val="white"/>
+              </a:solidFill>
+              <a:effectLst/>
+              <a:uLnTx/>
+              <a:uFillTx/>
+              <a:latin typeface="Meiryo"/>
+              <a:ea typeface="+mn-ea"/>
+              <a:cs typeface="+mn-cs"/>
+            </a:endParaRPr>
+          </a:p>
+        </p:txBody>
+      </p:sp>
+      <p:sp>
+        <p:nvSpPr>
+          <p:cNvPr id="2" name="Заглавие 1">
+            <a:extLst>
+              <a:ext uri="{FF2B5EF4-FFF2-40B4-BE49-F238E27FC236}">
+                <a16:creationId xmlns:a16="http://schemas.microsoft.com/office/drawing/2014/main" id="{AD795ACD-E8C5-4715-A670-9D431675C8CD}"/>
+              </a:ext>
+            </a:extLst>
+          </p:cNvPr>
+          <p:cNvSpPr>
+            <a:spLocks noGrp="1"/>
+          </p:cNvSpPr>
+          <p:nvPr>
+            <p:ph type="title"/>
+          </p:nvPr>
+        </p:nvSpPr>
+        <p:spPr>
+          <a:xfrm>
+            <a:off x="7587615" y="1045596"/>
+            <a:ext cx="4148511" cy="2045334"/>
+          </a:xfrm>
+        </p:spPr>
+        <p:txBody>
+          <a:bodyPr anchor="b">
+            <a:normAutofit/>
+          </a:bodyPr>
+          <a:lstStyle/>
+          <a:p>
+            <a:r>
+              <a:rPr lang="en-US" dirty="0"/>
+              <a:t>Connection string</a:t>
+            </a:r>
+            <a:endParaRPr lang="bg-BG" dirty="0"/>
+          </a:p>
+        </p:txBody>
+      </p:sp>
+      <p:pic>
+        <p:nvPicPr>
+          <p:cNvPr id="5" name="Картина 4">
+            <a:extLst>
+              <a:ext uri="{FF2B5EF4-FFF2-40B4-BE49-F238E27FC236}">
+                <a16:creationId xmlns:a16="http://schemas.microsoft.com/office/drawing/2014/main" id="{7321A34B-24A0-402A-87AD-76D92B89C38B}"/>
+              </a:ext>
+            </a:extLst>
+          </p:cNvPr>
+          <p:cNvPicPr>
+            <a:picLocks noChangeAspect="1"/>
+          </p:cNvPicPr>
+          <p:nvPr/>
+        </p:nvPicPr>
+        <p:blipFill>
+          <a:blip r:embed="rId2"/>
+          <a:stretch>
+            <a:fillRect/>
+          </a:stretch>
+        </p:blipFill>
+        <p:spPr>
+          <a:xfrm>
+            <a:off x="260815" y="3767071"/>
+            <a:ext cx="7954123" cy="2843598"/>
+          </a:xfrm>
+          <a:prstGeom prst="rect">
+            <a:avLst/>
+          </a:prstGeom>
+        </p:spPr>
+      </p:pic>
+      <p:pic>
+        <p:nvPicPr>
+          <p:cNvPr id="4" name="Картина 3">
+            <a:extLst>
+              <a:ext uri="{FF2B5EF4-FFF2-40B4-BE49-F238E27FC236}">
+                <a16:creationId xmlns:a16="http://schemas.microsoft.com/office/drawing/2014/main" id="{919B4092-D1EA-471F-A944-E93EAD462596}"/>
+              </a:ext>
+            </a:extLst>
+          </p:cNvPr>
+          <p:cNvPicPr>
+            <a:picLocks noChangeAspect="1"/>
+          </p:cNvPicPr>
+          <p:nvPr/>
+        </p:nvPicPr>
+        <p:blipFill rotWithShape="1">
+          <a:blip r:embed="rId3"/>
+          <a:srcRect b="28686"/>
+          <a:stretch/>
+        </p:blipFill>
+        <p:spPr>
+          <a:xfrm>
+            <a:off x="2276138" y="177275"/>
+            <a:ext cx="3224908" cy="3251725"/>
+          </a:xfrm>
+          <a:prstGeom prst="rect">
+            <a:avLst/>
+          </a:prstGeom>
+        </p:spPr>
+      </p:pic>
+      <p:sp>
+        <p:nvSpPr>
+          <p:cNvPr id="3" name="Контейнер за съдържание 2">
+            <a:extLst>
+              <a:ext uri="{FF2B5EF4-FFF2-40B4-BE49-F238E27FC236}">
+                <a16:creationId xmlns:a16="http://schemas.microsoft.com/office/drawing/2014/main" id="{641A12E8-337D-4B12-B479-2BFFEE46679D}"/>
+              </a:ext>
+            </a:extLst>
+          </p:cNvPr>
+          <p:cNvSpPr>
+            <a:spLocks noGrp="1"/>
+          </p:cNvSpPr>
+          <p:nvPr>
+            <p:ph idx="1"/>
+          </p:nvPr>
+        </p:nvSpPr>
+        <p:spPr>
+          <a:xfrm>
+            <a:off x="7684369" y="3220279"/>
+            <a:ext cx="3996098" cy="2385392"/>
+          </a:xfrm>
+        </p:spPr>
+        <p:txBody>
+          <a:bodyPr>
+            <a:normAutofit/>
+          </a:bodyPr>
+          <a:lstStyle/>
+          <a:p>
+            <a:endParaRPr lang="bg-BG"/>
+          </a:p>
+        </p:txBody>
+      </p:sp>
+    </p:spTree>
+    <p:extLst>
+      <p:ext uri="{BB962C8B-B14F-4D97-AF65-F5344CB8AC3E}">
+        <p14:creationId xmlns:p14="http://schemas.microsoft.com/office/powerpoint/2010/main" val="3477540261"/>
+      </p:ext>
+    </p:extLst>
+  </p:cSld>
+  <p:clrMapOvr>
+    <a:masterClrMapping/>
+  </p:clrMapOvr>
+</p:sld>
+</file>
+
+<file path=ppt/slides/slide6.xml><?xml version="1.0" encoding="utf-8"?>
+<p:sld xmlns:a="http://schemas.openxmlformats.org/drawingml/2006/main" xmlns:r="http://schemas.openxmlformats.org/officeDocument/2006/relationships" xmlns:p="http://schemas.openxmlformats.org/presentationml/2006/main">
+  <p:cSld>
+    <p:bg>
+      <p:bgPr>
+        <a:solidFill>
+          <a:schemeClr val="bg2"/>
+        </a:solidFill>
+        <a:effectLst/>
+      </p:bgPr>
+    </p:bg>
+    <p:spTree>
+      <p:nvGrpSpPr>
+        <p:cNvPr id="1" name=""/>
+        <p:cNvGrpSpPr/>
+        <p:nvPr/>
+      </p:nvGrpSpPr>
+      <p:grpSpPr>
+        <a:xfrm>
+          <a:off x="0" y="0"/>
+          <a:ext cx="0" cy="0"/>
+          <a:chOff x="0" y="0"/>
+          <a:chExt cx="0" cy="0"/>
+        </a:xfrm>
+      </p:grpSpPr>
+      <p:sp useBgFill="1">
+        <p:nvSpPr>
           <p:cNvPr id="47" name="Rectangle 9">
             <a:extLst>
               <a:ext uri="{FF2B5EF4-FFF2-40B4-BE49-F238E27FC236}">
@@ -22247,7 +24080,7 @@
 </p:sld>
 </file>
 
-<file path=ppt/slides/slide6.xml><?xml version="1.0" encoding="utf-8"?>
+<file path=ppt/slides/slide7.xml><?xml version="1.0" encoding="utf-8"?>
 <p:sld xmlns:a="http://schemas.openxmlformats.org/drawingml/2006/main" xmlns:r="http://schemas.openxmlformats.org/officeDocument/2006/relationships" xmlns:p="http://schemas.openxmlformats.org/presentationml/2006/main">
   <p:cSld>
     <p:bg>
@@ -24244,7 +26077,7 @@
 </p:sld>
 </file>
 
-<file path=ppt/slides/slide7.xml><?xml version="1.0" encoding="utf-8"?>
+<file path=ppt/slides/slide8.xml><?xml version="1.0" encoding="utf-8"?>
 <p:sld xmlns:a="http://schemas.openxmlformats.org/drawingml/2006/main" xmlns:r="http://schemas.openxmlformats.org/officeDocument/2006/relationships" xmlns:p="http://schemas.openxmlformats.org/presentationml/2006/main">
   <p:cSld>
     <p:bg>
@@ -25132,7 +26965,7 @@
 </p:sld>
 </file>
 
-<file path=ppt/slides/slide8.xml><?xml version="1.0" encoding="utf-8"?>
+<file path=ppt/slides/slide9.xml><?xml version="1.0" encoding="utf-8"?>
 <p:sld xmlns:a="http://schemas.openxmlformats.org/drawingml/2006/main" xmlns:r="http://schemas.openxmlformats.org/officeDocument/2006/relationships" xmlns:p="http://schemas.openxmlformats.org/presentationml/2006/main">
   <p:cSld>
     <p:bg>
@@ -27155,941 +28988,6 @@
     <p:extLst>
       <p:ext uri="{BB962C8B-B14F-4D97-AF65-F5344CB8AC3E}">
         <p14:creationId xmlns:p14="http://schemas.microsoft.com/office/powerpoint/2010/main" val="4057612978"/>
-      </p:ext>
-    </p:extLst>
-  </p:cSld>
-  <p:clrMapOvr>
-    <a:masterClrMapping/>
-  </p:clrMapOvr>
-</p:sld>
-</file>
-
-<file path=ppt/slides/slide9.xml><?xml version="1.0" encoding="utf-8"?>
-<p:sld xmlns:a="http://schemas.openxmlformats.org/drawingml/2006/main" xmlns:r="http://schemas.openxmlformats.org/officeDocument/2006/relationships" xmlns:p="http://schemas.openxmlformats.org/presentationml/2006/main">
-  <p:cSld>
-    <p:bg>
-      <p:bgPr>
-        <a:solidFill>
-          <a:schemeClr val="bg2"/>
-        </a:solidFill>
-        <a:effectLst/>
-      </p:bgPr>
-    </p:bg>
-    <p:spTree>
-      <p:nvGrpSpPr>
-        <p:cNvPr id="1" name=""/>
-        <p:cNvGrpSpPr/>
-        <p:nvPr/>
-      </p:nvGrpSpPr>
-      <p:grpSpPr>
-        <a:xfrm>
-          <a:off x="0" y="0"/>
-          <a:ext cx="0" cy="0"/>
-          <a:chOff x="0" y="0"/>
-          <a:chExt cx="0" cy="0"/>
-        </a:xfrm>
-      </p:grpSpPr>
-      <p:sp useBgFill="1">
-        <p:nvSpPr>
-          <p:cNvPr id="9" name="Rectangle 8">
-            <a:extLst>
-              <a:ext uri="{FF2B5EF4-FFF2-40B4-BE49-F238E27FC236}">
-                <a16:creationId xmlns:a16="http://schemas.microsoft.com/office/drawing/2014/main" id="{8181FC64-B306-4821-98E2-780662EFC486}"/>
-              </a:ext>
-              <a:ext uri="{C183D7F6-B498-43B3-948B-1728B52AA6E4}">
-                <adec:decorative xmlns:adec="http://schemas.microsoft.com/office/drawing/2017/decorative" val="1"/>
-              </a:ext>
-            </a:extLst>
-          </p:cNvPr>
-          <p:cNvSpPr>
-            <a:spLocks noGrp="1" noRot="1" noChangeAspect="1" noMove="1" noResize="1" noEditPoints="1" noAdjustHandles="1" noChangeArrowheads="1" noChangeShapeType="1" noTextEdit="1"/>
-          </p:cNvSpPr>
-          <p:nvPr>
-            <p:extLst>
-              <p:ext uri="{386F3935-93C4-4BCD-93E2-E3B085C9AB24}">
-                <p16:designElem xmlns:p16="http://schemas.microsoft.com/office/powerpoint/2015/main" val="1"/>
-              </p:ext>
-            </p:extLst>
-          </p:nvPr>
-        </p:nvSpPr>
-        <p:spPr>
-          <a:xfrm>
-            <a:off x="305" y="0"/>
-            <a:ext cx="12191695" cy="6858000"/>
-          </a:xfrm>
-          <a:prstGeom prst="rect">
-            <a:avLst/>
-          </a:prstGeom>
-          <a:ln>
-            <a:noFill/>
-          </a:ln>
-        </p:spPr>
-        <p:style>
-          <a:lnRef idx="2">
-            <a:schemeClr val="accent1">
-              <a:shade val="50000"/>
-            </a:schemeClr>
-          </a:lnRef>
-          <a:fillRef idx="1">
-            <a:schemeClr val="accent1"/>
-          </a:fillRef>
-          <a:effectRef idx="0">
-            <a:schemeClr val="accent1"/>
-          </a:effectRef>
-          <a:fontRef idx="minor">
-            <a:schemeClr val="lt1"/>
-          </a:fontRef>
-        </p:style>
-        <p:txBody>
-          <a:bodyPr rtlCol="0" anchor="ctr"/>
-          <a:lstStyle/>
-          <a:p>
-            <a:pPr marL="0" marR="0" lvl="0" indent="0" algn="ctr" defTabSz="457200" rtl="0" eaLnBrk="1" fontAlgn="auto" latinLnBrk="0" hangingPunct="1">
-              <a:lnSpc>
-                <a:spcPct val="100000"/>
-              </a:lnSpc>
-              <a:spcBef>
-                <a:spcPts val="0"/>
-              </a:spcBef>
-              <a:spcAft>
-                <a:spcPts val="0"/>
-              </a:spcAft>
-              <a:buClrTx/>
-              <a:buSzTx/>
-              <a:buFontTx/>
-              <a:buNone/>
-              <a:tabLst/>
-              <a:defRPr/>
-            </a:pPr>
-            <a:endParaRPr kumimoji="0" lang="en-US" sz="1800" b="0" i="0" u="none" strike="noStrike" kern="1200" cap="none" spc="0" normalizeH="0" baseline="0" noProof="0" dirty="0">
-              <a:ln>
-                <a:noFill/>
-              </a:ln>
-              <a:solidFill>
-                <a:prstClr val="white"/>
-              </a:solidFill>
-              <a:effectLst/>
-              <a:uLnTx/>
-              <a:uFillTx/>
-              <a:latin typeface="Meiryo"/>
-              <a:ea typeface="+mn-ea"/>
-              <a:cs typeface="+mn-cs"/>
-            </a:endParaRPr>
-          </a:p>
-        </p:txBody>
-      </p:sp>
-      <p:sp>
-        <p:nvSpPr>
-          <p:cNvPr id="11" name="Freeform: Shape 10">
-            <a:extLst>
-              <a:ext uri="{FF2B5EF4-FFF2-40B4-BE49-F238E27FC236}">
-                <a16:creationId xmlns:a16="http://schemas.microsoft.com/office/drawing/2014/main" id="{BC0385E9-02B2-4941-889A-EAD43F5BB0A3}"/>
-              </a:ext>
-              <a:ext uri="{C183D7F6-B498-43B3-948B-1728B52AA6E4}">
-                <adec:decorative xmlns:adec="http://schemas.microsoft.com/office/drawing/2017/decorative" val="1"/>
-              </a:ext>
-            </a:extLst>
-          </p:cNvPr>
-          <p:cNvSpPr>
-            <a:spLocks noGrp="1" noRot="1" noChangeAspect="1" noMove="1" noResize="1" noEditPoints="1" noAdjustHandles="1" noChangeArrowheads="1" noChangeShapeType="1" noTextEdit="1"/>
-          </p:cNvSpPr>
-          <p:nvPr>
-            <p:extLst>
-              <p:ext uri="{386F3935-93C4-4BCD-93E2-E3B085C9AB24}">
-                <p16:designElem xmlns:p16="http://schemas.microsoft.com/office/powerpoint/2015/main" val="1"/>
-              </p:ext>
-            </p:extLst>
-          </p:nvPr>
-        </p:nvSpPr>
-        <p:spPr>
-          <a:xfrm flipH="1">
-            <a:off x="6736139" y="0"/>
-            <a:ext cx="5455860" cy="6858000"/>
-          </a:xfrm>
-          <a:custGeom>
-            <a:avLst/>
-            <a:gdLst>
-              <a:gd name="connsiteX0" fmla="*/ 3832837 w 5455860"/>
-              <a:gd name="connsiteY0" fmla="*/ 0 h 6858000"/>
-              <a:gd name="connsiteX1" fmla="*/ 2739604 w 5455860"/>
-              <a:gd name="connsiteY1" fmla="*/ 0 h 6858000"/>
-              <a:gd name="connsiteX2" fmla="*/ 1959438 w 5455860"/>
-              <a:gd name="connsiteY2" fmla="*/ 0 h 6858000"/>
-              <a:gd name="connsiteX3" fmla="*/ 1895061 w 5455860"/>
-              <a:gd name="connsiteY3" fmla="*/ 0 h 6858000"/>
-              <a:gd name="connsiteX4" fmla="*/ 249909 w 5455860"/>
-              <a:gd name="connsiteY4" fmla="*/ 0 h 6858000"/>
-              <a:gd name="connsiteX5" fmla="*/ 0 w 5455860"/>
-              <a:gd name="connsiteY5" fmla="*/ 0 h 6858000"/>
-              <a:gd name="connsiteX6" fmla="*/ 0 w 5455860"/>
-              <a:gd name="connsiteY6" fmla="*/ 6858000 h 6858000"/>
-              <a:gd name="connsiteX7" fmla="*/ 249909 w 5455860"/>
-              <a:gd name="connsiteY7" fmla="*/ 6858000 h 6858000"/>
-              <a:gd name="connsiteX8" fmla="*/ 1895061 w 5455860"/>
-              <a:gd name="connsiteY8" fmla="*/ 6858000 h 6858000"/>
-              <a:gd name="connsiteX9" fmla="*/ 1959438 w 5455860"/>
-              <a:gd name="connsiteY9" fmla="*/ 6858000 h 6858000"/>
-              <a:gd name="connsiteX10" fmla="*/ 2739604 w 5455860"/>
-              <a:gd name="connsiteY10" fmla="*/ 6858000 h 6858000"/>
-              <a:gd name="connsiteX11" fmla="*/ 2953106 w 5455860"/>
-              <a:gd name="connsiteY11" fmla="*/ 6858000 h 6858000"/>
-              <a:gd name="connsiteX12" fmla="*/ 3064862 w 5455860"/>
-              <a:gd name="connsiteY12" fmla="*/ 6780599 h 6858000"/>
-              <a:gd name="connsiteX13" fmla="*/ 3581510 w 5455860"/>
-              <a:gd name="connsiteY13" fmla="*/ 6374814 h 6858000"/>
-              <a:gd name="connsiteX14" fmla="*/ 5455860 w 5455860"/>
-              <a:gd name="connsiteY14" fmla="*/ 3621656 h 6858000"/>
-              <a:gd name="connsiteX15" fmla="*/ 3854961 w 5455860"/>
-              <a:gd name="connsiteY15" fmla="*/ 14997 h 6858000"/>
-            </a:gdLst>
-            <a:ahLst/>
-            <a:cxnLst>
-              <a:cxn ang="0">
-                <a:pos x="connsiteX0" y="connsiteY0"/>
-              </a:cxn>
-              <a:cxn ang="0">
-                <a:pos x="connsiteX1" y="connsiteY1"/>
-              </a:cxn>
-              <a:cxn ang="0">
-                <a:pos x="connsiteX2" y="connsiteY2"/>
-              </a:cxn>
-              <a:cxn ang="0">
-                <a:pos x="connsiteX3" y="connsiteY3"/>
-              </a:cxn>
-              <a:cxn ang="0">
-                <a:pos x="connsiteX4" y="connsiteY4"/>
-              </a:cxn>
-              <a:cxn ang="0">
-                <a:pos x="connsiteX5" y="connsiteY5"/>
-              </a:cxn>
-              <a:cxn ang="0">
-                <a:pos x="connsiteX6" y="connsiteY6"/>
-              </a:cxn>
-              <a:cxn ang="0">
-                <a:pos x="connsiteX7" y="connsiteY7"/>
-              </a:cxn>
-              <a:cxn ang="0">
-                <a:pos x="connsiteX8" y="connsiteY8"/>
-              </a:cxn>
-              <a:cxn ang="0">
-                <a:pos x="connsiteX9" y="connsiteY9"/>
-              </a:cxn>
-              <a:cxn ang="0">
-                <a:pos x="connsiteX10" y="connsiteY10"/>
-              </a:cxn>
-              <a:cxn ang="0">
-                <a:pos x="connsiteX11" y="connsiteY11"/>
-              </a:cxn>
-              <a:cxn ang="0">
-                <a:pos x="connsiteX12" y="connsiteY12"/>
-              </a:cxn>
-              <a:cxn ang="0">
-                <a:pos x="connsiteX13" y="connsiteY13"/>
-              </a:cxn>
-              <a:cxn ang="0">
-                <a:pos x="connsiteX14" y="connsiteY14"/>
-              </a:cxn>
-              <a:cxn ang="0">
-                <a:pos x="connsiteX15" y="connsiteY15"/>
-              </a:cxn>
-            </a:cxnLst>
-            <a:rect l="l" t="t" r="r" b="b"/>
-            <a:pathLst>
-              <a:path w="5455860" h="6858000">
-                <a:moveTo>
-                  <a:pt x="3832837" y="0"/>
-                </a:moveTo>
-                <a:lnTo>
-                  <a:pt x="2739604" y="0"/>
-                </a:lnTo>
-                <a:lnTo>
-                  <a:pt x="1959438" y="0"/>
-                </a:lnTo>
-                <a:lnTo>
-                  <a:pt x="1895061" y="0"/>
-                </a:lnTo>
-                <a:lnTo>
-                  <a:pt x="249909" y="0"/>
-                </a:lnTo>
-                <a:lnTo>
-                  <a:pt x="0" y="0"/>
-                </a:lnTo>
-                <a:lnTo>
-                  <a:pt x="0" y="6858000"/>
-                </a:lnTo>
-                <a:lnTo>
-                  <a:pt x="249909" y="6858000"/>
-                </a:lnTo>
-                <a:lnTo>
-                  <a:pt x="1895061" y="6858000"/>
-                </a:lnTo>
-                <a:lnTo>
-                  <a:pt x="1959438" y="6858000"/>
-                </a:lnTo>
-                <a:lnTo>
-                  <a:pt x="2739604" y="6858000"/>
-                </a:lnTo>
-                <a:lnTo>
-                  <a:pt x="2953106" y="6858000"/>
-                </a:lnTo>
-                <a:lnTo>
-                  <a:pt x="3064862" y="6780599"/>
-                </a:lnTo>
-                <a:cubicBezTo>
-                  <a:pt x="3238680" y="6653108"/>
-                  <a:pt x="3409307" y="6515397"/>
-                  <a:pt x="3581510" y="6374814"/>
-                </a:cubicBezTo>
-                <a:cubicBezTo>
-                  <a:pt x="4527135" y="5602839"/>
-                  <a:pt x="5455860" y="4969131"/>
-                  <a:pt x="5455860" y="3621656"/>
-                </a:cubicBezTo>
-                <a:cubicBezTo>
-                  <a:pt x="5455860" y="2093192"/>
-                  <a:pt x="4882124" y="754641"/>
-                  <a:pt x="3854961" y="14997"/>
-                </a:cubicBezTo>
-                <a:close/>
-              </a:path>
-            </a:pathLst>
-          </a:custGeom>
-          <a:solidFill>
-            <a:schemeClr val="bg1">
-              <a:alpha val="60000"/>
-            </a:schemeClr>
-          </a:solidFill>
-          <a:ln>
-            <a:noFill/>
-          </a:ln>
-        </p:spPr>
-        <p:style>
-          <a:lnRef idx="2">
-            <a:schemeClr val="accent1">
-              <a:shade val="50000"/>
-            </a:schemeClr>
-          </a:lnRef>
-          <a:fillRef idx="1">
-            <a:schemeClr val="accent1"/>
-          </a:fillRef>
-          <a:effectRef idx="0">
-            <a:schemeClr val="accent1"/>
-          </a:effectRef>
-          <a:fontRef idx="minor">
-            <a:schemeClr val="lt1"/>
-          </a:fontRef>
-        </p:style>
-        <p:txBody>
-          <a:bodyPr wrap="square" rtlCol="0" anchor="ctr">
-            <a:noAutofit/>
-          </a:bodyPr>
-          <a:lstStyle/>
-          <a:p>
-            <a:pPr algn="ctr"/>
-            <a:endParaRPr lang="en-US" dirty="0"/>
-          </a:p>
-        </p:txBody>
-      </p:sp>
-      <p:sp>
-        <p:nvSpPr>
-          <p:cNvPr id="13" name="Freeform: Shape 12">
-            <a:extLst>
-              <a:ext uri="{FF2B5EF4-FFF2-40B4-BE49-F238E27FC236}">
-                <a16:creationId xmlns:a16="http://schemas.microsoft.com/office/drawing/2014/main" id="{829A1E2C-5AC8-40FC-99E9-832069D39792}"/>
-              </a:ext>
-              <a:ext uri="{C183D7F6-B498-43B3-948B-1728B52AA6E4}">
-                <adec:decorative xmlns:adec="http://schemas.microsoft.com/office/drawing/2017/decorative" val="1"/>
-              </a:ext>
-            </a:extLst>
-          </p:cNvPr>
-          <p:cNvSpPr>
-            <a:spLocks noGrp="1" noRot="1" noChangeAspect="1" noMove="1" noResize="1" noEditPoints="1" noAdjustHandles="1" noChangeArrowheads="1" noChangeShapeType="1" noTextEdit="1"/>
-          </p:cNvSpPr>
-          <p:nvPr>
-            <p:extLst>
-              <p:ext uri="{386F3935-93C4-4BCD-93E2-E3B085C9AB24}">
-                <p16:designElem xmlns:p16="http://schemas.microsoft.com/office/powerpoint/2015/main" val="1"/>
-              </p:ext>
-            </p:extLst>
-          </p:nvPr>
-        </p:nvSpPr>
-        <p:spPr>
-          <a:xfrm flipH="1">
-            <a:off x="6255864" y="0"/>
-            <a:ext cx="2529723" cy="6858000"/>
-          </a:xfrm>
-          <a:custGeom>
-            <a:avLst/>
-            <a:gdLst>
-              <a:gd name="connsiteX0" fmla="*/ 1258269 w 2529723"/>
-              <a:gd name="connsiteY0" fmla="*/ 0 h 6858000"/>
-              <a:gd name="connsiteX1" fmla="*/ 1275627 w 2529723"/>
-              <a:gd name="connsiteY1" fmla="*/ 0 h 6858000"/>
-              <a:gd name="connsiteX2" fmla="*/ 1302560 w 2529723"/>
-              <a:gd name="connsiteY2" fmla="*/ 24338 h 6858000"/>
-              <a:gd name="connsiteX3" fmla="*/ 2522825 w 2529723"/>
-              <a:gd name="connsiteY3" fmla="*/ 3678515 h 6858000"/>
-              <a:gd name="connsiteX4" fmla="*/ 557500 w 2529723"/>
-              <a:gd name="connsiteY4" fmla="*/ 6451411 h 6858000"/>
-              <a:gd name="connsiteX5" fmla="*/ 32482 w 2529723"/>
-              <a:gd name="connsiteY5" fmla="*/ 6849373 h 6858000"/>
-              <a:gd name="connsiteX6" fmla="*/ 19531 w 2529723"/>
-              <a:gd name="connsiteY6" fmla="*/ 6858000 h 6858000"/>
-              <a:gd name="connsiteX7" fmla="*/ 0 w 2529723"/>
-              <a:gd name="connsiteY7" fmla="*/ 6858000 h 6858000"/>
-              <a:gd name="connsiteX8" fmla="*/ 14202 w 2529723"/>
-              <a:gd name="connsiteY8" fmla="*/ 6848540 h 6858000"/>
-              <a:gd name="connsiteX9" fmla="*/ 539221 w 2529723"/>
-              <a:gd name="connsiteY9" fmla="*/ 6450578 h 6858000"/>
-              <a:gd name="connsiteX10" fmla="*/ 2504546 w 2529723"/>
-              <a:gd name="connsiteY10" fmla="*/ 3677682 h 6858000"/>
-              <a:gd name="connsiteX11" fmla="*/ 1284280 w 2529723"/>
-              <a:gd name="connsiteY11" fmla="*/ 23504 h 6858000"/>
-            </a:gdLst>
-            <a:ahLst/>
-            <a:cxnLst>
-              <a:cxn ang="0">
-                <a:pos x="connsiteX0" y="connsiteY0"/>
-              </a:cxn>
-              <a:cxn ang="0">
-                <a:pos x="connsiteX1" y="connsiteY1"/>
-              </a:cxn>
-              <a:cxn ang="0">
-                <a:pos x="connsiteX2" y="connsiteY2"/>
-              </a:cxn>
-              <a:cxn ang="0">
-                <a:pos x="connsiteX3" y="connsiteY3"/>
-              </a:cxn>
-              <a:cxn ang="0">
-                <a:pos x="connsiteX4" y="connsiteY4"/>
-              </a:cxn>
-              <a:cxn ang="0">
-                <a:pos x="connsiteX5" y="connsiteY5"/>
-              </a:cxn>
-              <a:cxn ang="0">
-                <a:pos x="connsiteX6" y="connsiteY6"/>
-              </a:cxn>
-              <a:cxn ang="0">
-                <a:pos x="connsiteX7" y="connsiteY7"/>
-              </a:cxn>
-              <a:cxn ang="0">
-                <a:pos x="connsiteX8" y="connsiteY8"/>
-              </a:cxn>
-              <a:cxn ang="0">
-                <a:pos x="connsiteX9" y="connsiteY9"/>
-              </a:cxn>
-              <a:cxn ang="0">
-                <a:pos x="connsiteX10" y="connsiteY10"/>
-              </a:cxn>
-              <a:cxn ang="0">
-                <a:pos x="connsiteX11" y="connsiteY11"/>
-              </a:cxn>
-            </a:cxnLst>
-            <a:rect l="l" t="t" r="r" b="b"/>
-            <a:pathLst>
-              <a:path w="2529723" h="6858000">
-                <a:moveTo>
-                  <a:pt x="1258269" y="0"/>
-                </a:moveTo>
-                <a:lnTo>
-                  <a:pt x="1275627" y="0"/>
-                </a:lnTo>
-                <a:lnTo>
-                  <a:pt x="1302560" y="24338"/>
-                </a:lnTo>
-                <a:cubicBezTo>
-                  <a:pt x="2156831" y="855667"/>
-                  <a:pt x="2590622" y="2191755"/>
-                  <a:pt x="2522825" y="3678515"/>
-                </a:cubicBezTo>
-                <a:cubicBezTo>
-                  <a:pt x="2459072" y="5076606"/>
-                  <a:pt x="1519830" y="5692656"/>
-                  <a:pt x="557500" y="6451411"/>
-                </a:cubicBezTo>
-                <a:cubicBezTo>
-                  <a:pt x="382255" y="6589587"/>
-                  <a:pt x="208689" y="6724853"/>
-                  <a:pt x="32482" y="6849373"/>
-                </a:cubicBezTo>
-                <a:lnTo>
-                  <a:pt x="19531" y="6858000"/>
-                </a:lnTo>
-                <a:lnTo>
-                  <a:pt x="0" y="6858000"/>
-                </a:lnTo>
-                <a:lnTo>
-                  <a:pt x="14202" y="6848540"/>
-                </a:lnTo>
-                <a:cubicBezTo>
-                  <a:pt x="190409" y="6724020"/>
-                  <a:pt x="363976" y="6588754"/>
-                  <a:pt x="539221" y="6450578"/>
-                </a:cubicBezTo>
-                <a:cubicBezTo>
-                  <a:pt x="1501550" y="5691822"/>
-                  <a:pt x="2440792" y="5075773"/>
-                  <a:pt x="2504546" y="3677682"/>
-                </a:cubicBezTo>
-                <a:cubicBezTo>
-                  <a:pt x="2572343" y="2190921"/>
-                  <a:pt x="2138551" y="854834"/>
-                  <a:pt x="1284280" y="23504"/>
-                </a:cubicBezTo>
-                <a:close/>
-              </a:path>
-            </a:pathLst>
-          </a:custGeom>
-          <a:solidFill>
-            <a:srgbClr val="FFFFFF"/>
-          </a:solidFill>
-          <a:ln>
-            <a:noFill/>
-          </a:ln>
-        </p:spPr>
-        <p:style>
-          <a:lnRef idx="2">
-            <a:schemeClr val="accent1">
-              <a:shade val="50000"/>
-            </a:schemeClr>
-          </a:lnRef>
-          <a:fillRef idx="1">
-            <a:schemeClr val="accent1"/>
-          </a:fillRef>
-          <a:effectRef idx="0">
-            <a:schemeClr val="accent1"/>
-          </a:effectRef>
-          <a:fontRef idx="minor">
-            <a:schemeClr val="lt1"/>
-          </a:fontRef>
-        </p:style>
-        <p:txBody>
-          <a:bodyPr wrap="square" rtlCol="0" anchor="ctr">
-            <a:noAutofit/>
-          </a:bodyPr>
-          <a:lstStyle/>
-          <a:p>
-            <a:pPr marL="0" marR="0" lvl="0" indent="0" algn="ctr" defTabSz="457200" rtl="0" eaLnBrk="1" fontAlgn="auto" latinLnBrk="0" hangingPunct="1">
-              <a:lnSpc>
-                <a:spcPct val="100000"/>
-              </a:lnSpc>
-              <a:spcBef>
-                <a:spcPts val="0"/>
-              </a:spcBef>
-              <a:spcAft>
-                <a:spcPts val="0"/>
-              </a:spcAft>
-              <a:buClrTx/>
-              <a:buSzTx/>
-              <a:buFontTx/>
-              <a:buNone/>
-              <a:tabLst/>
-              <a:defRPr/>
-            </a:pPr>
-            <a:endParaRPr kumimoji="0" lang="en-US" sz="1800" b="0" i="0" u="none" strike="noStrike" kern="1200" cap="none" spc="0" normalizeH="0" baseline="0" noProof="0" dirty="0">
-              <a:ln>
-                <a:noFill/>
-              </a:ln>
-              <a:solidFill>
-                <a:prstClr val="white"/>
-              </a:solidFill>
-              <a:effectLst/>
-              <a:uLnTx/>
-              <a:uFillTx/>
-              <a:latin typeface="Meiryo"/>
-              <a:ea typeface="+mn-ea"/>
-              <a:cs typeface="+mn-cs"/>
-            </a:endParaRPr>
-          </a:p>
-        </p:txBody>
-      </p:sp>
-      <p:sp>
-        <p:nvSpPr>
-          <p:cNvPr id="15" name="Freeform: Shape 14">
-            <a:extLst>
-              <a:ext uri="{FF2B5EF4-FFF2-40B4-BE49-F238E27FC236}">
-                <a16:creationId xmlns:a16="http://schemas.microsoft.com/office/drawing/2014/main" id="{55C54A75-E44A-4147-B9D0-FF46CFD31612}"/>
-              </a:ext>
-              <a:ext uri="{C183D7F6-B498-43B3-948B-1728B52AA6E4}">
-                <adec:decorative xmlns:adec="http://schemas.microsoft.com/office/drawing/2017/decorative" val="1"/>
-              </a:ext>
-            </a:extLst>
-          </p:cNvPr>
-          <p:cNvSpPr>
-            <a:spLocks noGrp="1" noRot="1" noChangeAspect="1" noMove="1" noResize="1" noEditPoints="1" noAdjustHandles="1" noChangeArrowheads="1" noChangeShapeType="1" noTextEdit="1"/>
-          </p:cNvSpPr>
-          <p:nvPr>
-            <p:extLst>
-              <p:ext uri="{386F3935-93C4-4BCD-93E2-E3B085C9AB24}">
-                <p16:designElem xmlns:p16="http://schemas.microsoft.com/office/powerpoint/2015/main" val="1"/>
-              </p:ext>
-            </p:extLst>
-          </p:nvPr>
-        </p:nvSpPr>
-        <p:spPr>
-          <a:xfrm flipH="1">
-            <a:off x="6469160" y="0"/>
-            <a:ext cx="2536434" cy="6858000"/>
-          </a:xfrm>
-          <a:custGeom>
-            <a:avLst/>
-            <a:gdLst>
-              <a:gd name="connsiteX0" fmla="*/ 879731 w 2536434"/>
-              <a:gd name="connsiteY0" fmla="*/ 0 h 6858000"/>
-              <a:gd name="connsiteX1" fmla="*/ 913411 w 2536434"/>
-              <a:gd name="connsiteY1" fmla="*/ 0 h 6858000"/>
-              <a:gd name="connsiteX2" fmla="*/ 935535 w 2536434"/>
-              <a:gd name="connsiteY2" fmla="*/ 14997 h 6858000"/>
-              <a:gd name="connsiteX3" fmla="*/ 2536434 w 2536434"/>
-              <a:gd name="connsiteY3" fmla="*/ 3621656 h 6858000"/>
-              <a:gd name="connsiteX4" fmla="*/ 662084 w 2536434"/>
-              <a:gd name="connsiteY4" fmla="*/ 6374814 h 6858000"/>
-              <a:gd name="connsiteX5" fmla="*/ 145436 w 2536434"/>
-              <a:gd name="connsiteY5" fmla="*/ 6780599 h 6858000"/>
-              <a:gd name="connsiteX6" fmla="*/ 33680 w 2536434"/>
-              <a:gd name="connsiteY6" fmla="*/ 6858000 h 6858000"/>
-              <a:gd name="connsiteX7" fmla="*/ 0 w 2536434"/>
-              <a:gd name="connsiteY7" fmla="*/ 6858000 h 6858000"/>
-              <a:gd name="connsiteX8" fmla="*/ 111756 w 2536434"/>
-              <a:gd name="connsiteY8" fmla="*/ 6780599 h 6858000"/>
-              <a:gd name="connsiteX9" fmla="*/ 628404 w 2536434"/>
-              <a:gd name="connsiteY9" fmla="*/ 6374814 h 6858000"/>
-              <a:gd name="connsiteX10" fmla="*/ 2502754 w 2536434"/>
-              <a:gd name="connsiteY10" fmla="*/ 3621656 h 6858000"/>
-              <a:gd name="connsiteX11" fmla="*/ 901855 w 2536434"/>
-              <a:gd name="connsiteY11" fmla="*/ 14997 h 6858000"/>
-            </a:gdLst>
-            <a:ahLst/>
-            <a:cxnLst>
-              <a:cxn ang="0">
-                <a:pos x="connsiteX0" y="connsiteY0"/>
-              </a:cxn>
-              <a:cxn ang="0">
-                <a:pos x="connsiteX1" y="connsiteY1"/>
-              </a:cxn>
-              <a:cxn ang="0">
-                <a:pos x="connsiteX2" y="connsiteY2"/>
-              </a:cxn>
-              <a:cxn ang="0">
-                <a:pos x="connsiteX3" y="connsiteY3"/>
-              </a:cxn>
-              <a:cxn ang="0">
-                <a:pos x="connsiteX4" y="connsiteY4"/>
-              </a:cxn>
-              <a:cxn ang="0">
-                <a:pos x="connsiteX5" y="connsiteY5"/>
-              </a:cxn>
-              <a:cxn ang="0">
-                <a:pos x="connsiteX6" y="connsiteY6"/>
-              </a:cxn>
-              <a:cxn ang="0">
-                <a:pos x="connsiteX7" y="connsiteY7"/>
-              </a:cxn>
-              <a:cxn ang="0">
-                <a:pos x="connsiteX8" y="connsiteY8"/>
-              </a:cxn>
-              <a:cxn ang="0">
-                <a:pos x="connsiteX9" y="connsiteY9"/>
-              </a:cxn>
-              <a:cxn ang="0">
-                <a:pos x="connsiteX10" y="connsiteY10"/>
-              </a:cxn>
-              <a:cxn ang="0">
-                <a:pos x="connsiteX11" y="connsiteY11"/>
-              </a:cxn>
-            </a:cxnLst>
-            <a:rect l="l" t="t" r="r" b="b"/>
-            <a:pathLst>
-              <a:path w="2536434" h="6858000">
-                <a:moveTo>
-                  <a:pt x="879731" y="0"/>
-                </a:moveTo>
-                <a:lnTo>
-                  <a:pt x="913411" y="0"/>
-                </a:lnTo>
-                <a:lnTo>
-                  <a:pt x="935535" y="14997"/>
-                </a:lnTo>
-                <a:cubicBezTo>
-                  <a:pt x="1962698" y="754641"/>
-                  <a:pt x="2536434" y="2093192"/>
-                  <a:pt x="2536434" y="3621656"/>
-                </a:cubicBezTo>
-                <a:cubicBezTo>
-                  <a:pt x="2536434" y="4969131"/>
-                  <a:pt x="1607709" y="5602839"/>
-                  <a:pt x="662084" y="6374814"/>
-                </a:cubicBezTo>
-                <a:cubicBezTo>
-                  <a:pt x="489881" y="6515397"/>
-                  <a:pt x="319254" y="6653108"/>
-                  <a:pt x="145436" y="6780599"/>
-                </a:cubicBezTo>
-                <a:lnTo>
-                  <a:pt x="33680" y="6858000"/>
-                </a:lnTo>
-                <a:lnTo>
-                  <a:pt x="0" y="6858000"/>
-                </a:lnTo>
-                <a:lnTo>
-                  <a:pt x="111756" y="6780599"/>
-                </a:lnTo>
-                <a:cubicBezTo>
-                  <a:pt x="285574" y="6653108"/>
-                  <a:pt x="456201" y="6515397"/>
-                  <a:pt x="628404" y="6374814"/>
-                </a:cubicBezTo>
-                <a:cubicBezTo>
-                  <a:pt x="1574029" y="5602839"/>
-                  <a:pt x="2502754" y="4969131"/>
-                  <a:pt x="2502754" y="3621656"/>
-                </a:cubicBezTo>
-                <a:cubicBezTo>
-                  <a:pt x="2502754" y="2093192"/>
-                  <a:pt x="1929018" y="754641"/>
-                  <a:pt x="901855" y="14997"/>
-                </a:cubicBezTo>
-                <a:close/>
-              </a:path>
-            </a:pathLst>
-          </a:custGeom>
-          <a:solidFill>
-            <a:srgbClr val="FFFFFF"/>
-          </a:solidFill>
-          <a:ln>
-            <a:noFill/>
-          </a:ln>
-        </p:spPr>
-        <p:style>
-          <a:lnRef idx="2">
-            <a:schemeClr val="accent1">
-              <a:shade val="50000"/>
-            </a:schemeClr>
-          </a:lnRef>
-          <a:fillRef idx="1">
-            <a:schemeClr val="accent1"/>
-          </a:fillRef>
-          <a:effectRef idx="0">
-            <a:schemeClr val="accent1"/>
-          </a:effectRef>
-          <a:fontRef idx="minor">
-            <a:schemeClr val="lt1"/>
-          </a:fontRef>
-        </p:style>
-        <p:txBody>
-          <a:bodyPr wrap="square" rtlCol="0" anchor="ctr">
-            <a:noAutofit/>
-          </a:bodyPr>
-          <a:lstStyle/>
-          <a:p>
-            <a:pPr marL="0" marR="0" lvl="0" indent="0" algn="ctr" defTabSz="914400" rtl="0" eaLnBrk="1" fontAlgn="auto" latinLnBrk="0" hangingPunct="1">
-              <a:lnSpc>
-                <a:spcPct val="100000"/>
-              </a:lnSpc>
-              <a:spcBef>
-                <a:spcPts val="0"/>
-              </a:spcBef>
-              <a:spcAft>
-                <a:spcPts val="0"/>
-              </a:spcAft>
-              <a:buClrTx/>
-              <a:buSzTx/>
-              <a:buFontTx/>
-              <a:buNone/>
-              <a:tabLst/>
-              <a:defRPr/>
-            </a:pPr>
-            <a:endParaRPr kumimoji="0" lang="en-US" sz="1800" b="0" i="0" u="none" strike="noStrike" kern="1200" cap="none" spc="0" normalizeH="0" baseline="0" noProof="0" dirty="0">
-              <a:ln>
-                <a:noFill/>
-              </a:ln>
-              <a:solidFill>
-                <a:prstClr val="white"/>
-              </a:solidFill>
-              <a:effectLst/>
-              <a:uLnTx/>
-              <a:uFillTx/>
-              <a:latin typeface="Meiryo"/>
-              <a:ea typeface="+mn-ea"/>
-              <a:cs typeface="+mn-cs"/>
-            </a:endParaRPr>
-          </a:p>
-        </p:txBody>
-      </p:sp>
-      <p:sp>
-        <p:nvSpPr>
-          <p:cNvPr id="2" name="Заглавие 1">
-            <a:extLst>
-              <a:ext uri="{FF2B5EF4-FFF2-40B4-BE49-F238E27FC236}">
-                <a16:creationId xmlns:a16="http://schemas.microsoft.com/office/drawing/2014/main" id="{E49CB42F-2A5D-46C9-93F1-AEEA2C382E39}"/>
-              </a:ext>
-            </a:extLst>
-          </p:cNvPr>
-          <p:cNvSpPr>
-            <a:spLocks noGrp="1"/>
-          </p:cNvSpPr>
-          <p:nvPr>
-            <p:ph type="title"/>
-          </p:nvPr>
-        </p:nvSpPr>
-        <p:spPr>
-          <a:xfrm>
-            <a:off x="7093258" y="1045597"/>
-            <a:ext cx="4987631" cy="940108"/>
-          </a:xfrm>
-        </p:spPr>
-        <p:txBody>
-          <a:bodyPr anchor="b">
-            <a:normAutofit/>
-          </a:bodyPr>
-          <a:lstStyle/>
-          <a:p>
-            <a:r>
-              <a:rPr lang="en-US" sz="3600" dirty="0"/>
-              <a:t>Create migration</a:t>
-            </a:r>
-            <a:endParaRPr lang="bg-BG" sz="3600" dirty="0"/>
-          </a:p>
-        </p:txBody>
-      </p:sp>
-      <p:pic>
-        <p:nvPicPr>
-          <p:cNvPr id="4" name="Картина 3">
-            <a:extLst>
-              <a:ext uri="{FF2B5EF4-FFF2-40B4-BE49-F238E27FC236}">
-                <a16:creationId xmlns:a16="http://schemas.microsoft.com/office/drawing/2014/main" id="{8E551DB8-B27E-4D3C-B0F7-CDD935E56E35}"/>
-              </a:ext>
-            </a:extLst>
-          </p:cNvPr>
-          <p:cNvPicPr>
-            <a:picLocks noChangeAspect="1"/>
-          </p:cNvPicPr>
-          <p:nvPr/>
-        </p:nvPicPr>
-        <p:blipFill>
-          <a:blip r:embed="rId2"/>
-          <a:stretch>
-            <a:fillRect/>
-          </a:stretch>
-        </p:blipFill>
-        <p:spPr>
-          <a:xfrm>
-            <a:off x="111111" y="2150051"/>
-            <a:ext cx="6081613" cy="2341421"/>
-          </a:xfrm>
-          <a:prstGeom prst="rect">
-            <a:avLst/>
-          </a:prstGeom>
-        </p:spPr>
-      </p:pic>
-      <p:sp>
-        <p:nvSpPr>
-          <p:cNvPr id="3" name="Контейнер за съдържание 2">
-            <a:extLst>
-              <a:ext uri="{FF2B5EF4-FFF2-40B4-BE49-F238E27FC236}">
-                <a16:creationId xmlns:a16="http://schemas.microsoft.com/office/drawing/2014/main" id="{3E1AE3EB-D88D-4F8F-AD3E-D7C777558AA5}"/>
-              </a:ext>
-            </a:extLst>
-          </p:cNvPr>
-          <p:cNvSpPr>
-            <a:spLocks noGrp="1"/>
-          </p:cNvSpPr>
-          <p:nvPr>
-            <p:ph idx="1"/>
-          </p:nvPr>
-        </p:nvSpPr>
-        <p:spPr>
-          <a:xfrm>
-            <a:off x="6975558" y="2236304"/>
-            <a:ext cx="5223029" cy="2385392"/>
-          </a:xfrm>
-        </p:spPr>
-        <p:txBody>
-          <a:bodyPr>
-            <a:noAutofit/>
-          </a:bodyPr>
-          <a:lstStyle/>
-          <a:p>
-            <a:pPr marL="285750" indent="-285750">
-              <a:lnSpc>
-                <a:spcPct val="130000"/>
-              </a:lnSpc>
-              <a:buFont typeface="Wingdings" panose="05000000000000000000" pitchFamily="2" charset="2"/>
-              <a:buChar char="Ø"/>
-            </a:pPr>
-            <a:r>
-              <a:rPr lang="en-US" sz="2200" dirty="0"/>
-              <a:t>Open Package Manager Console</a:t>
-            </a:r>
-          </a:p>
-          <a:p>
-            <a:pPr marL="285750" indent="-285750">
-              <a:lnSpc>
-                <a:spcPct val="130000"/>
-              </a:lnSpc>
-              <a:buFont typeface="Wingdings" panose="05000000000000000000" pitchFamily="2" charset="2"/>
-              <a:buChar char="Ø"/>
-            </a:pPr>
-            <a:r>
-              <a:rPr lang="en-US" sz="2200" dirty="0"/>
-              <a:t>Select correct project (Data)</a:t>
-            </a:r>
-          </a:p>
-          <a:p>
-            <a:pPr marL="285750" indent="-285750">
-              <a:lnSpc>
-                <a:spcPct val="130000"/>
-              </a:lnSpc>
-              <a:buFont typeface="Wingdings" panose="05000000000000000000" pitchFamily="2" charset="2"/>
-              <a:buChar char="Ø"/>
-            </a:pPr>
-            <a:r>
-              <a:rPr lang="en-US" sz="2200" dirty="0"/>
-              <a:t>Add-migration </a:t>
-            </a:r>
-            <a:r>
-              <a:rPr lang="en-US" sz="2200" dirty="0" err="1"/>
-              <a:t>MigrationName</a:t>
-            </a:r>
-            <a:endParaRPr lang="bg-BG" sz="2200" dirty="0"/>
-          </a:p>
-          <a:p>
-            <a:pPr marL="285750" indent="-285750">
-              <a:lnSpc>
-                <a:spcPct val="130000"/>
-              </a:lnSpc>
-              <a:buFont typeface="Wingdings" panose="05000000000000000000" pitchFamily="2" charset="2"/>
-              <a:buChar char="Ø"/>
-            </a:pPr>
-            <a:r>
-              <a:rPr lang="en-US" sz="2200" dirty="0"/>
-              <a:t>View Migration</a:t>
-            </a:r>
-          </a:p>
-          <a:p>
-            <a:pPr marL="285750" indent="-285750">
-              <a:lnSpc>
-                <a:spcPct val="130000"/>
-              </a:lnSpc>
-              <a:buFont typeface="Wingdings" panose="05000000000000000000" pitchFamily="2" charset="2"/>
-              <a:buChar char="Ø"/>
-            </a:pPr>
-            <a:endParaRPr lang="en-US" sz="2200" dirty="0"/>
-          </a:p>
-          <a:p>
-            <a:pPr>
-              <a:lnSpc>
-                <a:spcPct val="130000"/>
-              </a:lnSpc>
-            </a:pPr>
-            <a:endParaRPr lang="bg-BG" sz="2200" dirty="0"/>
-          </a:p>
-        </p:txBody>
-      </p:sp>
-    </p:spTree>
-    <p:extLst>
-      <p:ext uri="{BB962C8B-B14F-4D97-AF65-F5344CB8AC3E}">
-        <p14:creationId xmlns:p14="http://schemas.microsoft.com/office/powerpoint/2010/main" val="1327105541"/>
       </p:ext>
     </p:extLst>
   </p:cSld>
@@ -28498,18 +29396,18 @@
 </file>
 
 <file path=customXml/item2.xml><?xml version="1.0" encoding="utf-8"?>
+<p:properties xmlns:p="http://schemas.microsoft.com/office/2006/metadata/properties" xmlns:xsi="http://www.w3.org/2001/XMLSchema-instance" xmlns:pc="http://schemas.microsoft.com/office/infopath/2007/PartnerControls">
+  <documentManagement/>
+</p:properties>
+</file>
+
+<file path=customXml/item3.xml><?xml version="1.0" encoding="utf-8"?>
 <?mso-contentType ?>
 <FormTemplates xmlns="http://schemas.microsoft.com/sharepoint/v3/contenttype/forms">
   <Display>DocumentLibraryForm</Display>
   <Edit>DocumentLibraryForm</Edit>
   <New>DocumentLibraryForm</New>
 </FormTemplates>
-</file>
-
-<file path=customXml/item3.xml><?xml version="1.0" encoding="utf-8"?>
-<p:properties xmlns:p="http://schemas.microsoft.com/office/2006/metadata/properties" xmlns:xsi="http://www.w3.org/2001/XMLSchema-instance" xmlns:pc="http://schemas.microsoft.com/office/infopath/2007/PartnerControls">
-  <documentManagement/>
-</p:properties>
 </file>
 
 <file path=customXml/itemProps1.xml><?xml version="1.0" encoding="utf-8"?>
@@ -28532,14 +29430,6 @@
 </file>
 
 <file path=customXml/itemProps2.xml><?xml version="1.0" encoding="utf-8"?>
-<ds:datastoreItem xmlns:ds="http://schemas.openxmlformats.org/officeDocument/2006/customXml" ds:itemID="{A0FF991E-5147-44D5-A9B0-F290C90C8EB5}">
-  <ds:schemaRefs>
-    <ds:schemaRef ds:uri="http://schemas.microsoft.com/sharepoint/v3/contenttype/forms"/>
-  </ds:schemaRefs>
-</ds:datastoreItem>
-</file>
-
-<file path=customXml/itemProps3.xml><?xml version="1.0" encoding="utf-8"?>
 <ds:datastoreItem xmlns:ds="http://schemas.openxmlformats.org/officeDocument/2006/customXml" ds:itemID="{E3AA3DF2-9D8E-49E1-AE10-A435C33A937A}">
   <ds:schemaRefs>
     <ds:schemaRef ds:uri="http://schemas.microsoft.com/office/2006/metadata/properties"/>
@@ -28554,4 +29444,12 @@
     <ds:schemaRef ds:uri="http://purl.org/dc/dcmitype/"/>
   </ds:schemaRefs>
 </ds:datastoreItem>
+</file>
+
+<file path=customXml/itemProps3.xml><?xml version="1.0" encoding="utf-8"?>
+<ds:datastoreItem xmlns:ds="http://schemas.openxmlformats.org/officeDocument/2006/customXml" ds:itemID="{A0FF991E-5147-44D5-A9B0-F290C90C8EB5}">
+  <ds:schemaRefs>
+    <ds:schemaRef ds:uri="http://schemas.microsoft.com/sharepoint/v3/contenttype/forms"/>
+  </ds:schemaRefs>
+</ds:datastoreItem>
 </file>
</xml_diff>